<commit_message>
correcion modelos y graficas serofoi
</commit_message>
<xml_diff>
--- a/Graficas/HPV 16  -18 Por país –Alta.pptx
+++ b/Graficas/HPV 16  -18 Por país –Alta.pptx
@@ -4,6 +4,9 @@
   <p:sldMasterIdLst>
     <p:sldMasterId id="2147483648" r:id="rId1"/>
   </p:sldMasterIdLst>
+  <p:notesMasterIdLst>
+    <p:notesMasterId r:id="rId22"/>
+  </p:notesMasterIdLst>
   <p:sldIdLst>
     <p:sldId id="275" r:id="rId2"/>
     <p:sldId id="273" r:id="rId3"/>
@@ -123,7 +126,1211 @@
       </a:defRPr>
     </a:lvl9pPr>
   </p:defaultTextStyle>
+  <p:extLst>
+    <p:ext uri="{EFAFB233-063F-42B5-8137-9DF3F51BA10A}">
+      <p15:sldGuideLst xmlns:p15="http://schemas.microsoft.com/office/powerpoint/2012/main"/>
+    </p:ext>
+  </p:extLst>
 </p:presentation>
+</file>
+
+<file path=ppt/revisionInfo.xml><?xml version="1.0" encoding="utf-8"?>
+<p1510:revInfo xmlns:a="http://schemas.openxmlformats.org/drawingml/2006/main" xmlns:r="http://schemas.openxmlformats.org/officeDocument/2006/relationships" xmlns:p1510="http://schemas.microsoft.com/office/powerpoint/2015/10/main">
+  <p1510:revLst>
+    <p1510:client id="{480980D8-EB31-4630-8616-892D1CF22178}" v="9" dt="2024-01-23T00:08:20.698"/>
+  </p1510:revLst>
+</p1510:revInfo>
+</file>
+
+<file path=ppt/changesInfos/changesInfo1.xml><?xml version="1.0" encoding="utf-8"?>
+<pc:chgInfo xmlns:a="http://schemas.openxmlformats.org/drawingml/2006/main" xmlns:r="http://schemas.openxmlformats.org/officeDocument/2006/relationships" xmlns:ac="http://schemas.microsoft.com/office/drawing/2013/main/command" xmlns:pc="http://schemas.microsoft.com/office/powerpoint/2013/main/command">
+  <pc:docChgLst>
+    <pc:chgData name="JENNY CAROLINA DUSSÁN NIÑO" userId="eaf10c2cd7d88393" providerId="LiveId" clId="{480980D8-EB31-4630-8616-892D1CF22178}"/>
+    <pc:docChg chg="undo custSel modSld">
+      <pc:chgData name="JENNY CAROLINA DUSSÁN NIÑO" userId="eaf10c2cd7d88393" providerId="LiveId" clId="{480980D8-EB31-4630-8616-892D1CF22178}" dt="2024-01-23T02:00:48.339" v="833" actId="20577"/>
+      <pc:docMkLst>
+        <pc:docMk/>
+      </pc:docMkLst>
+      <pc:sldChg chg="modNotesTx">
+        <pc:chgData name="JENNY CAROLINA DUSSÁN NIÑO" userId="eaf10c2cd7d88393" providerId="LiveId" clId="{480980D8-EB31-4630-8616-892D1CF22178}" dt="2024-01-23T01:48:12.759" v="383" actId="20577"/>
+        <pc:sldMkLst>
+          <pc:docMk/>
+          <pc:sldMk cId="346576912" sldId="273"/>
+        </pc:sldMkLst>
+      </pc:sldChg>
+      <pc:sldChg chg="modNotesTx">
+        <pc:chgData name="JENNY CAROLINA DUSSÁN NIÑO" userId="eaf10c2cd7d88393" providerId="LiveId" clId="{480980D8-EB31-4630-8616-892D1CF22178}" dt="2024-01-23T01:49:15.984" v="521" actId="6549"/>
+        <pc:sldMkLst>
+          <pc:docMk/>
+          <pc:sldMk cId="3943420679" sldId="274"/>
+        </pc:sldMkLst>
+      </pc:sldChg>
+      <pc:sldChg chg="modNotesTx">
+        <pc:chgData name="JENNY CAROLINA DUSSÁN NIÑO" userId="eaf10c2cd7d88393" providerId="LiveId" clId="{480980D8-EB31-4630-8616-892D1CF22178}" dt="2024-01-23T01:50:21.414" v="629" actId="20577"/>
+        <pc:sldMkLst>
+          <pc:docMk/>
+          <pc:sldMk cId="149053188" sldId="276"/>
+        </pc:sldMkLst>
+      </pc:sldChg>
+      <pc:sldChg chg="modNotesTx">
+        <pc:chgData name="JENNY CAROLINA DUSSÁN NIÑO" userId="eaf10c2cd7d88393" providerId="LiveId" clId="{480980D8-EB31-4630-8616-892D1CF22178}" dt="2024-01-23T01:56:24.954" v="696" actId="20577"/>
+        <pc:sldMkLst>
+          <pc:docMk/>
+          <pc:sldMk cId="3659681651" sldId="277"/>
+        </pc:sldMkLst>
+      </pc:sldChg>
+      <pc:sldChg chg="modNotesTx">
+        <pc:chgData name="JENNY CAROLINA DUSSÁN NIÑO" userId="eaf10c2cd7d88393" providerId="LiveId" clId="{480980D8-EB31-4630-8616-892D1CF22178}" dt="2024-01-23T01:58:59.646" v="747" actId="20577"/>
+        <pc:sldMkLst>
+          <pc:docMk/>
+          <pc:sldMk cId="2601453406" sldId="278"/>
+        </pc:sldMkLst>
+      </pc:sldChg>
+      <pc:sldChg chg="modNotesTx">
+        <pc:chgData name="JENNY CAROLINA DUSSÁN NIÑO" userId="eaf10c2cd7d88393" providerId="LiveId" clId="{480980D8-EB31-4630-8616-892D1CF22178}" dt="2024-01-23T01:59:38.833" v="801" actId="20577"/>
+        <pc:sldMkLst>
+          <pc:docMk/>
+          <pc:sldMk cId="1037340267" sldId="280"/>
+        </pc:sldMkLst>
+      </pc:sldChg>
+      <pc:sldChg chg="modNotesTx">
+        <pc:chgData name="JENNY CAROLINA DUSSÁN NIÑO" userId="eaf10c2cd7d88393" providerId="LiveId" clId="{480980D8-EB31-4630-8616-892D1CF22178}" dt="2024-01-23T02:00:48.339" v="833" actId="20577"/>
+        <pc:sldMkLst>
+          <pc:docMk/>
+          <pc:sldMk cId="721354222" sldId="284"/>
+        </pc:sldMkLst>
+      </pc:sldChg>
+      <pc:sldChg chg="addSp delSp modSp mod">
+        <pc:chgData name="JENNY CAROLINA DUSSÁN NIÑO" userId="eaf10c2cd7d88393" providerId="LiveId" clId="{480980D8-EB31-4630-8616-892D1CF22178}" dt="2024-01-23T00:04:13.972" v="33" actId="1076"/>
+        <pc:sldMkLst>
+          <pc:docMk/>
+          <pc:sldMk cId="805240594" sldId="290"/>
+        </pc:sldMkLst>
+        <pc:spChg chg="mod">
+          <ac:chgData name="JENNY CAROLINA DUSSÁN NIÑO" userId="eaf10c2cd7d88393" providerId="LiveId" clId="{480980D8-EB31-4630-8616-892D1CF22178}" dt="2024-01-22T23:57:08.264" v="18" actId="20577"/>
+          <ac:spMkLst>
+            <pc:docMk/>
+            <pc:sldMk cId="805240594" sldId="290"/>
+            <ac:spMk id="2" creationId="{2D03BCD8-63BC-452B-780F-DB8A97F54C32}"/>
+          </ac:spMkLst>
+        </pc:spChg>
+        <pc:spChg chg="add">
+          <ac:chgData name="JENNY CAROLINA DUSSÁN NIÑO" userId="eaf10c2cd7d88393" providerId="LiveId" clId="{480980D8-EB31-4630-8616-892D1CF22178}" dt="2024-01-23T00:04:08.627" v="31"/>
+          <ac:spMkLst>
+            <pc:docMk/>
+            <pc:sldMk cId="805240594" sldId="290"/>
+            <ac:spMk id="4" creationId="{FBE10868-9E38-498C-4F91-3D195D5A962A}"/>
+          </ac:spMkLst>
+        </pc:spChg>
+        <pc:picChg chg="add del mod">
+          <ac:chgData name="JENNY CAROLINA DUSSÁN NIÑO" userId="eaf10c2cd7d88393" providerId="LiveId" clId="{480980D8-EB31-4630-8616-892D1CF22178}" dt="2024-01-23T00:04:07.693" v="30" actId="478"/>
+          <ac:picMkLst>
+            <pc:docMk/>
+            <pc:sldMk cId="805240594" sldId="290"/>
+            <ac:picMk id="3" creationId="{29E7F260-587E-D087-3385-742CA3650F8C}"/>
+          </ac:picMkLst>
+        </pc:picChg>
+        <pc:picChg chg="del mod">
+          <ac:chgData name="JENNY CAROLINA DUSSÁN NIÑO" userId="eaf10c2cd7d88393" providerId="LiveId" clId="{480980D8-EB31-4630-8616-892D1CF22178}" dt="2024-01-22T23:49:48.965" v="1" actId="478"/>
+          <ac:picMkLst>
+            <pc:docMk/>
+            <pc:sldMk cId="805240594" sldId="290"/>
+            <ac:picMk id="5" creationId="{F7E9DEAA-A7D1-40A9-FCA4-E73EB20F3F82}"/>
+          </ac:picMkLst>
+        </pc:picChg>
+        <pc:picChg chg="add mod">
+          <ac:chgData name="JENNY CAROLINA DUSSÁN NIÑO" userId="eaf10c2cd7d88393" providerId="LiveId" clId="{480980D8-EB31-4630-8616-892D1CF22178}" dt="2024-01-23T00:04:13.972" v="33" actId="1076"/>
+          <ac:picMkLst>
+            <pc:docMk/>
+            <pc:sldMk cId="805240594" sldId="290"/>
+            <ac:picMk id="6" creationId="{57EE9D5A-EB80-A630-D4E2-E2354907C926}"/>
+          </ac:picMkLst>
+        </pc:picChg>
+      </pc:sldChg>
+      <pc:sldChg chg="addSp delSp modSp mod">
+        <pc:chgData name="JENNY CAROLINA DUSSÁN NIÑO" userId="eaf10c2cd7d88393" providerId="LiveId" clId="{480980D8-EB31-4630-8616-892D1CF22178}" dt="2024-01-23T00:06:01.390" v="36" actId="1076"/>
+        <pc:sldMkLst>
+          <pc:docMk/>
+          <pc:sldMk cId="1227578467" sldId="291"/>
+        </pc:sldMkLst>
+        <pc:spChg chg="mod">
+          <ac:chgData name="JENNY CAROLINA DUSSÁN NIÑO" userId="eaf10c2cd7d88393" providerId="LiveId" clId="{480980D8-EB31-4630-8616-892D1CF22178}" dt="2024-01-23T00:01:19.483" v="23" actId="27636"/>
+          <ac:spMkLst>
+            <pc:docMk/>
+            <pc:sldMk cId="1227578467" sldId="291"/>
+            <ac:spMk id="2" creationId="{725CE834-F55E-5261-44A8-53727AD96487}"/>
+          </ac:spMkLst>
+        </pc:spChg>
+        <pc:spChg chg="del">
+          <ac:chgData name="JENNY CAROLINA DUSSÁN NIÑO" userId="eaf10c2cd7d88393" providerId="LiveId" clId="{480980D8-EB31-4630-8616-892D1CF22178}" dt="2024-01-23T00:01:21.673" v="24" actId="478"/>
+          <ac:spMkLst>
+            <pc:docMk/>
+            <pc:sldMk cId="1227578467" sldId="291"/>
+            <ac:spMk id="3" creationId="{8705336F-3030-FF79-5410-92C2C98FDEEE}"/>
+          </ac:spMkLst>
+        </pc:spChg>
+        <pc:spChg chg="add del">
+          <ac:chgData name="JENNY CAROLINA DUSSÁN NIÑO" userId="eaf10c2cd7d88393" providerId="LiveId" clId="{480980D8-EB31-4630-8616-892D1CF22178}" dt="2024-01-23T00:01:24.977" v="26" actId="22"/>
+          <ac:spMkLst>
+            <pc:docMk/>
+            <pc:sldMk cId="1227578467" sldId="291"/>
+            <ac:spMk id="5" creationId="{9BC49AA6-490E-6AB7-B099-BAD50D202661}"/>
+          </ac:spMkLst>
+        </pc:spChg>
+        <pc:spChg chg="add">
+          <ac:chgData name="JENNY CAROLINA DUSSÁN NIÑO" userId="eaf10c2cd7d88393" providerId="LiveId" clId="{480980D8-EB31-4630-8616-892D1CF22178}" dt="2024-01-23T00:01:35.765" v="27"/>
+          <ac:spMkLst>
+            <pc:docMk/>
+            <pc:sldMk cId="1227578467" sldId="291"/>
+            <ac:spMk id="6" creationId="{050E6F54-A7DC-E48F-E749-2FBF7A28AA24}"/>
+          </ac:spMkLst>
+        </pc:spChg>
+        <pc:picChg chg="add del mod">
+          <ac:chgData name="JENNY CAROLINA DUSSÁN NIÑO" userId="eaf10c2cd7d88393" providerId="LiveId" clId="{480980D8-EB31-4630-8616-892D1CF22178}" dt="2024-01-23T00:04:19.072" v="34" actId="478"/>
+          <ac:picMkLst>
+            <pc:docMk/>
+            <pc:sldMk cId="1227578467" sldId="291"/>
+            <ac:picMk id="7" creationId="{687BF720-52C7-DD63-CFBD-A6F84436CD88}"/>
+          </ac:picMkLst>
+        </pc:picChg>
+        <pc:picChg chg="add mod">
+          <ac:chgData name="JENNY CAROLINA DUSSÁN NIÑO" userId="eaf10c2cd7d88393" providerId="LiveId" clId="{480980D8-EB31-4630-8616-892D1CF22178}" dt="2024-01-23T00:06:01.390" v="36" actId="1076"/>
+          <ac:picMkLst>
+            <pc:docMk/>
+            <pc:sldMk cId="1227578467" sldId="291"/>
+            <ac:picMk id="8" creationId="{E46B91E9-45A3-E6AE-9873-33FFE574D708}"/>
+          </ac:picMkLst>
+        </pc:picChg>
+      </pc:sldChg>
+      <pc:sldChg chg="addSp delSp modSp mod">
+        <pc:chgData name="JENNY CAROLINA DUSSÁN NIÑO" userId="eaf10c2cd7d88393" providerId="LiveId" clId="{480980D8-EB31-4630-8616-892D1CF22178}" dt="2024-01-23T00:08:37.577" v="55" actId="1076"/>
+        <pc:sldMkLst>
+          <pc:docMk/>
+          <pc:sldMk cId="3298773123" sldId="292"/>
+        </pc:sldMkLst>
+        <pc:spChg chg="mod">
+          <ac:chgData name="JENNY CAROLINA DUSSÁN NIÑO" userId="eaf10c2cd7d88393" providerId="LiveId" clId="{480980D8-EB31-4630-8616-892D1CF22178}" dt="2024-01-23T00:06:23.135" v="46" actId="27636"/>
+          <ac:spMkLst>
+            <pc:docMk/>
+            <pc:sldMk cId="3298773123" sldId="292"/>
+            <ac:spMk id="2" creationId="{E743D1B9-6583-3CAF-0966-0095639AA267}"/>
+          </ac:spMkLst>
+        </pc:spChg>
+        <pc:spChg chg="del">
+          <ac:chgData name="JENNY CAROLINA DUSSÁN NIÑO" userId="eaf10c2cd7d88393" providerId="LiveId" clId="{480980D8-EB31-4630-8616-892D1CF22178}" dt="2024-01-23T00:06:26.019" v="47" actId="478"/>
+          <ac:spMkLst>
+            <pc:docMk/>
+            <pc:sldMk cId="3298773123" sldId="292"/>
+            <ac:spMk id="3" creationId="{F2973803-41FF-2115-06E3-D9B9833A4BDF}"/>
+          </ac:spMkLst>
+        </pc:spChg>
+        <pc:picChg chg="add mod">
+          <ac:chgData name="JENNY CAROLINA DUSSÁN NIÑO" userId="eaf10c2cd7d88393" providerId="LiveId" clId="{480980D8-EB31-4630-8616-892D1CF22178}" dt="2024-01-23T00:08:37.577" v="55" actId="1076"/>
+          <ac:picMkLst>
+            <pc:docMk/>
+            <pc:sldMk cId="3298773123" sldId="292"/>
+            <ac:picMk id="4" creationId="{311546A2-DD7D-2332-F3E0-095B180E615F}"/>
+          </ac:picMkLst>
+        </pc:picChg>
+      </pc:sldChg>
+    </pc:docChg>
+  </pc:docChgLst>
+</pc:chgInfo>
+</file>
+
+<file path=ppt/notesMasters/notesMaster1.xml><?xml version="1.0" encoding="utf-8"?>
+<p:notesMaster xmlns:a="http://schemas.openxmlformats.org/drawingml/2006/main" xmlns:r="http://schemas.openxmlformats.org/officeDocument/2006/relationships" xmlns:p="http://schemas.openxmlformats.org/presentationml/2006/main">
+  <p:cSld>
+    <p:bg>
+      <p:bgRef idx="1001">
+        <a:schemeClr val="bg1"/>
+      </p:bgRef>
+    </p:bg>
+    <p:spTree>
+      <p:nvGrpSpPr>
+        <p:cNvPr id="1" name=""/>
+        <p:cNvGrpSpPr/>
+        <p:nvPr/>
+      </p:nvGrpSpPr>
+      <p:grpSpPr>
+        <a:xfrm>
+          <a:off x="0" y="0"/>
+          <a:ext cx="0" cy="0"/>
+          <a:chOff x="0" y="0"/>
+          <a:chExt cx="0" cy="0"/>
+        </a:xfrm>
+      </p:grpSpPr>
+      <p:sp>
+        <p:nvSpPr>
+          <p:cNvPr id="2" name="Marcador de encabezado 1"/>
+          <p:cNvSpPr>
+            <a:spLocks noGrp="1"/>
+          </p:cNvSpPr>
+          <p:nvPr>
+            <p:ph type="hdr" sz="quarter"/>
+          </p:nvPr>
+        </p:nvSpPr>
+        <p:spPr>
+          <a:xfrm>
+            <a:off x="0" y="0"/>
+            <a:ext cx="2971800" cy="458788"/>
+          </a:xfrm>
+          <a:prstGeom prst="rect">
+            <a:avLst/>
+          </a:prstGeom>
+        </p:spPr>
+        <p:txBody>
+          <a:bodyPr vert="horz" lIns="91440" tIns="45720" rIns="91440" bIns="45720" rtlCol="0"/>
+          <a:lstStyle>
+            <a:lvl1pPr algn="l">
+              <a:defRPr sz="1200"/>
+            </a:lvl1pPr>
+          </a:lstStyle>
+          <a:p>
+            <a:endParaRPr lang="es-CO"/>
+          </a:p>
+        </p:txBody>
+      </p:sp>
+      <p:sp>
+        <p:nvSpPr>
+          <p:cNvPr id="3" name="Marcador de fecha 2"/>
+          <p:cNvSpPr>
+            <a:spLocks noGrp="1"/>
+          </p:cNvSpPr>
+          <p:nvPr>
+            <p:ph type="dt" idx="1"/>
+          </p:nvPr>
+        </p:nvSpPr>
+        <p:spPr>
+          <a:xfrm>
+            <a:off x="3884613" y="0"/>
+            <a:ext cx="2971800" cy="458788"/>
+          </a:xfrm>
+          <a:prstGeom prst="rect">
+            <a:avLst/>
+          </a:prstGeom>
+        </p:spPr>
+        <p:txBody>
+          <a:bodyPr vert="horz" lIns="91440" tIns="45720" rIns="91440" bIns="45720" rtlCol="0"/>
+          <a:lstStyle>
+            <a:lvl1pPr algn="r">
+              <a:defRPr sz="1200"/>
+            </a:lvl1pPr>
+          </a:lstStyle>
+          <a:p>
+            <a:fld id="{F0331309-95D5-4F23-A343-7F784524681D}" type="datetimeFigureOut">
+              <a:rPr lang="es-CO" smtClean="0"/>
+              <a:t>22/01/2024</a:t>
+            </a:fld>
+            <a:endParaRPr lang="es-CO"/>
+          </a:p>
+        </p:txBody>
+      </p:sp>
+      <p:sp>
+        <p:nvSpPr>
+          <p:cNvPr id="4" name="Marcador de imagen de diapositiva 3"/>
+          <p:cNvSpPr>
+            <a:spLocks noGrp="1" noRot="1" noChangeAspect="1"/>
+          </p:cNvSpPr>
+          <p:nvPr>
+            <p:ph type="sldImg" idx="2"/>
+          </p:nvPr>
+        </p:nvSpPr>
+        <p:spPr>
+          <a:xfrm>
+            <a:off x="685800" y="1143000"/>
+            <a:ext cx="5486400" cy="3086100"/>
+          </a:xfrm>
+          <a:prstGeom prst="rect">
+            <a:avLst/>
+          </a:prstGeom>
+          <a:noFill/>
+          <a:ln w="12700">
+            <a:solidFill>
+              <a:prstClr val="black"/>
+            </a:solidFill>
+          </a:ln>
+        </p:spPr>
+        <p:txBody>
+          <a:bodyPr vert="horz" lIns="91440" tIns="45720" rIns="91440" bIns="45720" rtlCol="0" anchor="ctr"/>
+          <a:lstStyle/>
+          <a:p>
+            <a:endParaRPr lang="es-CO"/>
+          </a:p>
+        </p:txBody>
+      </p:sp>
+      <p:sp>
+        <p:nvSpPr>
+          <p:cNvPr id="5" name="Marcador de notas 4"/>
+          <p:cNvSpPr>
+            <a:spLocks noGrp="1"/>
+          </p:cNvSpPr>
+          <p:nvPr>
+            <p:ph type="body" sz="quarter" idx="3"/>
+          </p:nvPr>
+        </p:nvSpPr>
+        <p:spPr>
+          <a:xfrm>
+            <a:off x="685800" y="4400550"/>
+            <a:ext cx="5486400" cy="3600450"/>
+          </a:xfrm>
+          <a:prstGeom prst="rect">
+            <a:avLst/>
+          </a:prstGeom>
+        </p:spPr>
+        <p:txBody>
+          <a:bodyPr vert="horz" lIns="91440" tIns="45720" rIns="91440" bIns="45720" rtlCol="0"/>
+          <a:lstStyle/>
+          <a:p>
+            <a:pPr lvl="0"/>
+            <a:r>
+              <a:rPr lang="es-ES"/>
+              <a:t>Haga clic para modificar los estilos de texto del patrón</a:t>
+            </a:r>
+          </a:p>
+          <a:p>
+            <a:pPr lvl="1"/>
+            <a:r>
+              <a:rPr lang="es-ES"/>
+              <a:t>Segundo nivel</a:t>
+            </a:r>
+          </a:p>
+          <a:p>
+            <a:pPr lvl="2"/>
+            <a:r>
+              <a:rPr lang="es-ES"/>
+              <a:t>Tercer nivel</a:t>
+            </a:r>
+          </a:p>
+          <a:p>
+            <a:pPr lvl="3"/>
+            <a:r>
+              <a:rPr lang="es-ES"/>
+              <a:t>Cuarto nivel</a:t>
+            </a:r>
+          </a:p>
+          <a:p>
+            <a:pPr lvl="4"/>
+            <a:r>
+              <a:rPr lang="es-ES"/>
+              <a:t>Quinto nivel</a:t>
+            </a:r>
+            <a:endParaRPr lang="es-CO"/>
+          </a:p>
+        </p:txBody>
+      </p:sp>
+      <p:sp>
+        <p:nvSpPr>
+          <p:cNvPr id="6" name="Marcador de pie de página 5"/>
+          <p:cNvSpPr>
+            <a:spLocks noGrp="1"/>
+          </p:cNvSpPr>
+          <p:nvPr>
+            <p:ph type="ftr" sz="quarter" idx="4"/>
+          </p:nvPr>
+        </p:nvSpPr>
+        <p:spPr>
+          <a:xfrm>
+            <a:off x="0" y="8685213"/>
+            <a:ext cx="2971800" cy="458787"/>
+          </a:xfrm>
+          <a:prstGeom prst="rect">
+            <a:avLst/>
+          </a:prstGeom>
+        </p:spPr>
+        <p:txBody>
+          <a:bodyPr vert="horz" lIns="91440" tIns="45720" rIns="91440" bIns="45720" rtlCol="0" anchor="b"/>
+          <a:lstStyle>
+            <a:lvl1pPr algn="l">
+              <a:defRPr sz="1200"/>
+            </a:lvl1pPr>
+          </a:lstStyle>
+          <a:p>
+            <a:endParaRPr lang="es-CO"/>
+          </a:p>
+        </p:txBody>
+      </p:sp>
+      <p:sp>
+        <p:nvSpPr>
+          <p:cNvPr id="7" name="Marcador de número de diapositiva 6"/>
+          <p:cNvSpPr>
+            <a:spLocks noGrp="1"/>
+          </p:cNvSpPr>
+          <p:nvPr>
+            <p:ph type="sldNum" sz="quarter" idx="5"/>
+          </p:nvPr>
+        </p:nvSpPr>
+        <p:spPr>
+          <a:xfrm>
+            <a:off x="3884613" y="8685213"/>
+            <a:ext cx="2971800" cy="458787"/>
+          </a:xfrm>
+          <a:prstGeom prst="rect">
+            <a:avLst/>
+          </a:prstGeom>
+        </p:spPr>
+        <p:txBody>
+          <a:bodyPr vert="horz" lIns="91440" tIns="45720" rIns="91440" bIns="45720" rtlCol="0" anchor="b"/>
+          <a:lstStyle>
+            <a:lvl1pPr algn="r">
+              <a:defRPr sz="1200"/>
+            </a:lvl1pPr>
+          </a:lstStyle>
+          <a:p>
+            <a:fld id="{2B283FB9-E709-4212-8B1A-33278A85FB33}" type="slidenum">
+              <a:rPr lang="es-CO" smtClean="0"/>
+              <a:t>‹Nº›</a:t>
+            </a:fld>
+            <a:endParaRPr lang="es-CO"/>
+          </a:p>
+        </p:txBody>
+      </p:sp>
+    </p:spTree>
+    <p:extLst>
+      <p:ext uri="{BB962C8B-B14F-4D97-AF65-F5344CB8AC3E}">
+        <p14:creationId xmlns:p14="http://schemas.microsoft.com/office/powerpoint/2010/main" val="308046549"/>
+      </p:ext>
+    </p:extLst>
+  </p:cSld>
+  <p:clrMap bg1="lt1" tx1="dk1" bg2="lt2" tx2="dk2" accent1="accent1" accent2="accent2" accent3="accent3" accent4="accent4" accent5="accent5" accent6="accent6" hlink="hlink" folHlink="folHlink"/>
+  <p:notesStyle>
+    <a:lvl1pPr marL="0" algn="l" defTabSz="914400" rtl="0" eaLnBrk="1" latinLnBrk="0" hangingPunct="1">
+      <a:defRPr sz="1200" kern="1200">
+        <a:solidFill>
+          <a:schemeClr val="tx1"/>
+        </a:solidFill>
+        <a:latin typeface="+mn-lt"/>
+        <a:ea typeface="+mn-ea"/>
+        <a:cs typeface="+mn-cs"/>
+      </a:defRPr>
+    </a:lvl1pPr>
+    <a:lvl2pPr marL="457200" algn="l" defTabSz="914400" rtl="0" eaLnBrk="1" latinLnBrk="0" hangingPunct="1">
+      <a:defRPr sz="1200" kern="1200">
+        <a:solidFill>
+          <a:schemeClr val="tx1"/>
+        </a:solidFill>
+        <a:latin typeface="+mn-lt"/>
+        <a:ea typeface="+mn-ea"/>
+        <a:cs typeface="+mn-cs"/>
+      </a:defRPr>
+    </a:lvl2pPr>
+    <a:lvl3pPr marL="914400" algn="l" defTabSz="914400" rtl="0" eaLnBrk="1" latinLnBrk="0" hangingPunct="1">
+      <a:defRPr sz="1200" kern="1200">
+        <a:solidFill>
+          <a:schemeClr val="tx1"/>
+        </a:solidFill>
+        <a:latin typeface="+mn-lt"/>
+        <a:ea typeface="+mn-ea"/>
+        <a:cs typeface="+mn-cs"/>
+      </a:defRPr>
+    </a:lvl3pPr>
+    <a:lvl4pPr marL="1371600" algn="l" defTabSz="914400" rtl="0" eaLnBrk="1" latinLnBrk="0" hangingPunct="1">
+      <a:defRPr sz="1200" kern="1200">
+        <a:solidFill>
+          <a:schemeClr val="tx1"/>
+        </a:solidFill>
+        <a:latin typeface="+mn-lt"/>
+        <a:ea typeface="+mn-ea"/>
+        <a:cs typeface="+mn-cs"/>
+      </a:defRPr>
+    </a:lvl4pPr>
+    <a:lvl5pPr marL="1828800" algn="l" defTabSz="914400" rtl="0" eaLnBrk="1" latinLnBrk="0" hangingPunct="1">
+      <a:defRPr sz="1200" kern="1200">
+        <a:solidFill>
+          <a:schemeClr val="tx1"/>
+        </a:solidFill>
+        <a:latin typeface="+mn-lt"/>
+        <a:ea typeface="+mn-ea"/>
+        <a:cs typeface="+mn-cs"/>
+      </a:defRPr>
+    </a:lvl5pPr>
+    <a:lvl6pPr marL="2286000" algn="l" defTabSz="914400" rtl="0" eaLnBrk="1" latinLnBrk="0" hangingPunct="1">
+      <a:defRPr sz="1200" kern="1200">
+        <a:solidFill>
+          <a:schemeClr val="tx1"/>
+        </a:solidFill>
+        <a:latin typeface="+mn-lt"/>
+        <a:ea typeface="+mn-ea"/>
+        <a:cs typeface="+mn-cs"/>
+      </a:defRPr>
+    </a:lvl6pPr>
+    <a:lvl7pPr marL="2743200" algn="l" defTabSz="914400" rtl="0" eaLnBrk="1" latinLnBrk="0" hangingPunct="1">
+      <a:defRPr sz="1200" kern="1200">
+        <a:solidFill>
+          <a:schemeClr val="tx1"/>
+        </a:solidFill>
+        <a:latin typeface="+mn-lt"/>
+        <a:ea typeface="+mn-ea"/>
+        <a:cs typeface="+mn-cs"/>
+      </a:defRPr>
+    </a:lvl7pPr>
+    <a:lvl8pPr marL="3200400" algn="l" defTabSz="914400" rtl="0" eaLnBrk="1" latinLnBrk="0" hangingPunct="1">
+      <a:defRPr sz="1200" kern="1200">
+        <a:solidFill>
+          <a:schemeClr val="tx1"/>
+        </a:solidFill>
+        <a:latin typeface="+mn-lt"/>
+        <a:ea typeface="+mn-ea"/>
+        <a:cs typeface="+mn-cs"/>
+      </a:defRPr>
+    </a:lvl8pPr>
+    <a:lvl9pPr marL="3657600" algn="l" defTabSz="914400" rtl="0" eaLnBrk="1" latinLnBrk="0" hangingPunct="1">
+      <a:defRPr sz="1200" kern="1200">
+        <a:solidFill>
+          <a:schemeClr val="tx1"/>
+        </a:solidFill>
+        <a:latin typeface="+mn-lt"/>
+        <a:ea typeface="+mn-ea"/>
+        <a:cs typeface="+mn-cs"/>
+      </a:defRPr>
+    </a:lvl9pPr>
+  </p:notesStyle>
+</p:notesMaster>
+</file>
+
+<file path=ppt/notesSlides/notesSlide1.xml><?xml version="1.0" encoding="utf-8"?>
+<p:notes xmlns:a="http://schemas.openxmlformats.org/drawingml/2006/main" xmlns:r="http://schemas.openxmlformats.org/officeDocument/2006/relationships" xmlns:p="http://schemas.openxmlformats.org/presentationml/2006/main">
+  <p:cSld>
+    <p:spTree>
+      <p:nvGrpSpPr>
+        <p:cNvPr id="1" name=""/>
+        <p:cNvGrpSpPr/>
+        <p:nvPr/>
+      </p:nvGrpSpPr>
+      <p:grpSpPr>
+        <a:xfrm>
+          <a:off x="0" y="0"/>
+          <a:ext cx="0" cy="0"/>
+          <a:chOff x="0" y="0"/>
+          <a:chExt cx="0" cy="0"/>
+        </a:xfrm>
+      </p:grpSpPr>
+      <p:sp>
+        <p:nvSpPr>
+          <p:cNvPr id="2" name="Marcador de imagen de diapositiva 1"/>
+          <p:cNvSpPr>
+            <a:spLocks noGrp="1" noRot="1" noChangeAspect="1"/>
+          </p:cNvSpPr>
+          <p:nvPr>
+            <p:ph type="sldImg"/>
+          </p:nvPr>
+        </p:nvSpPr>
+        <p:spPr/>
+      </p:sp>
+      <p:sp>
+        <p:nvSpPr>
+          <p:cNvPr id="3" name="Marcador de notas 2"/>
+          <p:cNvSpPr>
+            <a:spLocks noGrp="1"/>
+          </p:cNvSpPr>
+          <p:nvPr>
+            <p:ph type="body" idx="1"/>
+          </p:nvPr>
+        </p:nvSpPr>
+        <p:spPr/>
+        <p:txBody>
+          <a:bodyPr/>
+          <a:lstStyle/>
+          <a:p>
+            <a:r>
+              <a:rPr lang="es-CO" dirty="0"/>
+              <a:t>La tendencia de la prevalencia para el serotipo 18 en las islas de países Bajo es mayor en Saint </a:t>
+            </a:r>
+            <a:r>
+              <a:rPr lang="es-CO" dirty="0" err="1"/>
+              <a:t>Eutatis</a:t>
+            </a:r>
+            <a:r>
+              <a:rPr lang="es-CO" dirty="0"/>
+              <a:t> aunque la muestra poblacional es pequeña, puede existir un sesgo en los extremos de las edades </a:t>
+            </a:r>
+          </a:p>
+        </p:txBody>
+      </p:sp>
+      <p:sp>
+        <p:nvSpPr>
+          <p:cNvPr id="4" name="Marcador de número de diapositiva 3"/>
+          <p:cNvSpPr>
+            <a:spLocks noGrp="1"/>
+          </p:cNvSpPr>
+          <p:nvPr>
+            <p:ph type="sldNum" sz="quarter" idx="5"/>
+          </p:nvPr>
+        </p:nvSpPr>
+        <p:spPr/>
+        <p:txBody>
+          <a:bodyPr/>
+          <a:lstStyle/>
+          <a:p>
+            <a:fld id="{2B283FB9-E709-4212-8B1A-33278A85FB33}" type="slidenum">
+              <a:rPr lang="es-CO" smtClean="0"/>
+              <a:t>2</a:t>
+            </a:fld>
+            <a:endParaRPr lang="es-CO"/>
+          </a:p>
+        </p:txBody>
+      </p:sp>
+    </p:spTree>
+    <p:extLst>
+      <p:ext uri="{BB962C8B-B14F-4D97-AF65-F5344CB8AC3E}">
+        <p14:creationId xmlns:p14="http://schemas.microsoft.com/office/powerpoint/2010/main" val="1571783773"/>
+      </p:ext>
+    </p:extLst>
+  </p:cSld>
+  <p:clrMapOvr>
+    <a:masterClrMapping/>
+  </p:clrMapOvr>
+</p:notes>
+</file>
+
+<file path=ppt/notesSlides/notesSlide2.xml><?xml version="1.0" encoding="utf-8"?>
+<p:notes xmlns:a="http://schemas.openxmlformats.org/drawingml/2006/main" xmlns:r="http://schemas.openxmlformats.org/officeDocument/2006/relationships" xmlns:p="http://schemas.openxmlformats.org/presentationml/2006/main">
+  <p:cSld>
+    <p:spTree>
+      <p:nvGrpSpPr>
+        <p:cNvPr id="1" name=""/>
+        <p:cNvGrpSpPr/>
+        <p:nvPr/>
+      </p:nvGrpSpPr>
+      <p:grpSpPr>
+        <a:xfrm>
+          <a:off x="0" y="0"/>
+          <a:ext cx="0" cy="0"/>
+          <a:chOff x="0" y="0"/>
+          <a:chExt cx="0" cy="0"/>
+        </a:xfrm>
+      </p:grpSpPr>
+      <p:sp>
+        <p:nvSpPr>
+          <p:cNvPr id="2" name="Marcador de imagen de diapositiva 1"/>
+          <p:cNvSpPr>
+            <a:spLocks noGrp="1" noRot="1" noChangeAspect="1"/>
+          </p:cNvSpPr>
+          <p:nvPr>
+            <p:ph type="sldImg"/>
+          </p:nvPr>
+        </p:nvSpPr>
+        <p:spPr/>
+      </p:sp>
+      <p:sp>
+        <p:nvSpPr>
+          <p:cNvPr id="3" name="Marcador de notas 2"/>
+          <p:cNvSpPr>
+            <a:spLocks noGrp="1"/>
+          </p:cNvSpPr>
+          <p:nvPr>
+            <p:ph type="body" idx="1"/>
+          </p:nvPr>
+        </p:nvSpPr>
+        <p:spPr/>
+        <p:txBody>
+          <a:bodyPr/>
+          <a:lstStyle/>
+          <a:p>
+            <a:r>
+              <a:rPr lang="es-CO" dirty="0"/>
+              <a:t>Para el Genotipo 16 esta más marcada el </a:t>
+            </a:r>
+            <a:r>
+              <a:rPr lang="es-CO" dirty="0" err="1"/>
+              <a:t>aumenro</a:t>
+            </a:r>
+            <a:r>
+              <a:rPr lang="es-CO" dirty="0"/>
+              <a:t> de la seroprevalencia con respecto a la edad </a:t>
+            </a:r>
+          </a:p>
+        </p:txBody>
+      </p:sp>
+      <p:sp>
+        <p:nvSpPr>
+          <p:cNvPr id="4" name="Marcador de número de diapositiva 3"/>
+          <p:cNvSpPr>
+            <a:spLocks noGrp="1"/>
+          </p:cNvSpPr>
+          <p:nvPr>
+            <p:ph type="sldNum" sz="quarter" idx="5"/>
+          </p:nvPr>
+        </p:nvSpPr>
+        <p:spPr/>
+        <p:txBody>
+          <a:bodyPr/>
+          <a:lstStyle/>
+          <a:p>
+            <a:fld id="{2B283FB9-E709-4212-8B1A-33278A85FB33}" type="slidenum">
+              <a:rPr lang="es-CO" smtClean="0"/>
+              <a:t>3</a:t>
+            </a:fld>
+            <a:endParaRPr lang="es-CO"/>
+          </a:p>
+        </p:txBody>
+      </p:sp>
+    </p:spTree>
+    <p:extLst>
+      <p:ext uri="{BB962C8B-B14F-4D97-AF65-F5344CB8AC3E}">
+        <p14:creationId xmlns:p14="http://schemas.microsoft.com/office/powerpoint/2010/main" val="1046543545"/>
+      </p:ext>
+    </p:extLst>
+  </p:cSld>
+  <p:clrMapOvr>
+    <a:masterClrMapping/>
+  </p:clrMapOvr>
+</p:notes>
+</file>
+
+<file path=ppt/notesSlides/notesSlide3.xml><?xml version="1.0" encoding="utf-8"?>
+<p:notes xmlns:a="http://schemas.openxmlformats.org/drawingml/2006/main" xmlns:r="http://schemas.openxmlformats.org/officeDocument/2006/relationships" xmlns:p="http://schemas.openxmlformats.org/presentationml/2006/main">
+  <p:cSld>
+    <p:spTree>
+      <p:nvGrpSpPr>
+        <p:cNvPr id="1" name=""/>
+        <p:cNvGrpSpPr/>
+        <p:nvPr/>
+      </p:nvGrpSpPr>
+      <p:grpSpPr>
+        <a:xfrm>
+          <a:off x="0" y="0"/>
+          <a:ext cx="0" cy="0"/>
+          <a:chOff x="0" y="0"/>
+          <a:chExt cx="0" cy="0"/>
+        </a:xfrm>
+      </p:grpSpPr>
+      <p:sp>
+        <p:nvSpPr>
+          <p:cNvPr id="2" name="Marcador de imagen de diapositiva 1"/>
+          <p:cNvSpPr>
+            <a:spLocks noGrp="1" noRot="1" noChangeAspect="1"/>
+          </p:cNvSpPr>
+          <p:nvPr>
+            <p:ph type="sldImg"/>
+          </p:nvPr>
+        </p:nvSpPr>
+        <p:spPr/>
+      </p:sp>
+      <p:sp>
+        <p:nvSpPr>
+          <p:cNvPr id="3" name="Marcador de notas 2"/>
+          <p:cNvSpPr>
+            <a:spLocks noGrp="1"/>
+          </p:cNvSpPr>
+          <p:nvPr>
+            <p:ph type="body" idx="1"/>
+          </p:nvPr>
+        </p:nvSpPr>
+        <p:spPr/>
+        <p:txBody>
+          <a:bodyPr/>
+          <a:lstStyle/>
+          <a:p>
+            <a:r>
+              <a:rPr lang="es-CO" dirty="0"/>
+              <a:t>En </a:t>
+            </a:r>
+            <a:r>
+              <a:rPr lang="es-CO" dirty="0" err="1"/>
+              <a:t>puero</a:t>
+            </a:r>
+            <a:r>
+              <a:rPr lang="es-CO" dirty="0"/>
+              <a:t> rico la seroprevalencia mayo esta entre los 20-30 y va disminuyendo con el tiempo</a:t>
+            </a:r>
+          </a:p>
+        </p:txBody>
+      </p:sp>
+      <p:sp>
+        <p:nvSpPr>
+          <p:cNvPr id="4" name="Marcador de número de diapositiva 3"/>
+          <p:cNvSpPr>
+            <a:spLocks noGrp="1"/>
+          </p:cNvSpPr>
+          <p:nvPr>
+            <p:ph type="sldNum" sz="quarter" idx="5"/>
+          </p:nvPr>
+        </p:nvSpPr>
+        <p:spPr/>
+        <p:txBody>
+          <a:bodyPr/>
+          <a:lstStyle/>
+          <a:p>
+            <a:fld id="{2B283FB9-E709-4212-8B1A-33278A85FB33}" type="slidenum">
+              <a:rPr lang="es-CO" smtClean="0"/>
+              <a:t>4</a:t>
+            </a:fld>
+            <a:endParaRPr lang="es-CO"/>
+          </a:p>
+        </p:txBody>
+      </p:sp>
+    </p:spTree>
+    <p:extLst>
+      <p:ext uri="{BB962C8B-B14F-4D97-AF65-F5344CB8AC3E}">
+        <p14:creationId xmlns:p14="http://schemas.microsoft.com/office/powerpoint/2010/main" val="2385258779"/>
+      </p:ext>
+    </p:extLst>
+  </p:cSld>
+  <p:clrMapOvr>
+    <a:masterClrMapping/>
+  </p:clrMapOvr>
+</p:notes>
+</file>
+
+<file path=ppt/notesSlides/notesSlide4.xml><?xml version="1.0" encoding="utf-8"?>
+<p:notes xmlns:a="http://schemas.openxmlformats.org/drawingml/2006/main" xmlns:r="http://schemas.openxmlformats.org/officeDocument/2006/relationships" xmlns:p="http://schemas.openxmlformats.org/presentationml/2006/main">
+  <p:cSld>
+    <p:spTree>
+      <p:nvGrpSpPr>
+        <p:cNvPr id="1" name=""/>
+        <p:cNvGrpSpPr/>
+        <p:nvPr/>
+      </p:nvGrpSpPr>
+      <p:grpSpPr>
+        <a:xfrm>
+          <a:off x="0" y="0"/>
+          <a:ext cx="0" cy="0"/>
+          <a:chOff x="0" y="0"/>
+          <a:chExt cx="0" cy="0"/>
+        </a:xfrm>
+      </p:grpSpPr>
+      <p:sp>
+        <p:nvSpPr>
+          <p:cNvPr id="2" name="Marcador de imagen de diapositiva 1"/>
+          <p:cNvSpPr>
+            <a:spLocks noGrp="1" noRot="1" noChangeAspect="1"/>
+          </p:cNvSpPr>
+          <p:nvPr>
+            <p:ph type="sldImg"/>
+          </p:nvPr>
+        </p:nvSpPr>
+        <p:spPr/>
+      </p:sp>
+      <p:sp>
+        <p:nvSpPr>
+          <p:cNvPr id="3" name="Marcador de notas 2"/>
+          <p:cNvSpPr>
+            <a:spLocks noGrp="1"/>
+          </p:cNvSpPr>
+          <p:nvPr>
+            <p:ph type="body" idx="1"/>
+          </p:nvPr>
+        </p:nvSpPr>
+        <p:spPr/>
+        <p:txBody>
+          <a:bodyPr/>
+          <a:lstStyle/>
+          <a:p>
+            <a:r>
+              <a:rPr lang="es-CO" dirty="0"/>
+              <a:t>Tendencia a </a:t>
+            </a:r>
+            <a:r>
+              <a:rPr lang="es-CO" dirty="0" err="1"/>
+              <a:t>picosde</a:t>
+            </a:r>
+            <a:r>
+              <a:rPr lang="es-CO" dirty="0"/>
+              <a:t> seroprevalencia después de los 30 años</a:t>
+            </a:r>
+          </a:p>
+        </p:txBody>
+      </p:sp>
+      <p:sp>
+        <p:nvSpPr>
+          <p:cNvPr id="4" name="Marcador de número de diapositiva 3"/>
+          <p:cNvSpPr>
+            <a:spLocks noGrp="1"/>
+          </p:cNvSpPr>
+          <p:nvPr>
+            <p:ph type="sldNum" sz="quarter" idx="5"/>
+          </p:nvPr>
+        </p:nvSpPr>
+        <p:spPr/>
+        <p:txBody>
+          <a:bodyPr/>
+          <a:lstStyle/>
+          <a:p>
+            <a:fld id="{2B283FB9-E709-4212-8B1A-33278A85FB33}" type="slidenum">
+              <a:rPr lang="es-CO" smtClean="0"/>
+              <a:t>5</a:t>
+            </a:fld>
+            <a:endParaRPr lang="es-CO"/>
+          </a:p>
+        </p:txBody>
+      </p:sp>
+    </p:spTree>
+    <p:extLst>
+      <p:ext uri="{BB962C8B-B14F-4D97-AF65-F5344CB8AC3E}">
+        <p14:creationId xmlns:p14="http://schemas.microsoft.com/office/powerpoint/2010/main" val="2560338505"/>
+      </p:ext>
+    </p:extLst>
+  </p:cSld>
+  <p:clrMapOvr>
+    <a:masterClrMapping/>
+  </p:clrMapOvr>
+</p:notes>
+</file>
+
+<file path=ppt/notesSlides/notesSlide5.xml><?xml version="1.0" encoding="utf-8"?>
+<p:notes xmlns:a="http://schemas.openxmlformats.org/drawingml/2006/main" xmlns:r="http://schemas.openxmlformats.org/officeDocument/2006/relationships" xmlns:p="http://schemas.openxmlformats.org/presentationml/2006/main">
+  <p:cSld>
+    <p:spTree>
+      <p:nvGrpSpPr>
+        <p:cNvPr id="1" name=""/>
+        <p:cNvGrpSpPr/>
+        <p:nvPr/>
+      </p:nvGrpSpPr>
+      <p:grpSpPr>
+        <a:xfrm>
+          <a:off x="0" y="0"/>
+          <a:ext cx="0" cy="0"/>
+          <a:chOff x="0" y="0"/>
+          <a:chExt cx="0" cy="0"/>
+        </a:xfrm>
+      </p:grpSpPr>
+      <p:sp>
+        <p:nvSpPr>
+          <p:cNvPr id="2" name="Marcador de imagen de diapositiva 1"/>
+          <p:cNvSpPr>
+            <a:spLocks noGrp="1" noRot="1" noChangeAspect="1"/>
+          </p:cNvSpPr>
+          <p:nvPr>
+            <p:ph type="sldImg"/>
+          </p:nvPr>
+        </p:nvSpPr>
+        <p:spPr/>
+      </p:sp>
+      <p:sp>
+        <p:nvSpPr>
+          <p:cNvPr id="3" name="Marcador de notas 2"/>
+          <p:cNvSpPr>
+            <a:spLocks noGrp="1"/>
+          </p:cNvSpPr>
+          <p:nvPr>
+            <p:ph type="body" idx="1"/>
+          </p:nvPr>
+        </p:nvSpPr>
+        <p:spPr/>
+        <p:txBody>
+          <a:bodyPr/>
+          <a:lstStyle/>
+          <a:p>
+            <a:r>
+              <a:rPr lang="es-CO" dirty="0"/>
+              <a:t>Tendencias en Latinoamérica aumenta con la edad </a:t>
+            </a:r>
+          </a:p>
+        </p:txBody>
+      </p:sp>
+      <p:sp>
+        <p:nvSpPr>
+          <p:cNvPr id="4" name="Marcador de número de diapositiva 3"/>
+          <p:cNvSpPr>
+            <a:spLocks noGrp="1"/>
+          </p:cNvSpPr>
+          <p:nvPr>
+            <p:ph type="sldNum" sz="quarter" idx="5"/>
+          </p:nvPr>
+        </p:nvSpPr>
+        <p:spPr/>
+        <p:txBody>
+          <a:bodyPr/>
+          <a:lstStyle/>
+          <a:p>
+            <a:fld id="{2B283FB9-E709-4212-8B1A-33278A85FB33}" type="slidenum">
+              <a:rPr lang="es-CO" smtClean="0"/>
+              <a:t>6</a:t>
+            </a:fld>
+            <a:endParaRPr lang="es-CO"/>
+          </a:p>
+        </p:txBody>
+      </p:sp>
+    </p:spTree>
+    <p:extLst>
+      <p:ext uri="{BB962C8B-B14F-4D97-AF65-F5344CB8AC3E}">
+        <p14:creationId xmlns:p14="http://schemas.microsoft.com/office/powerpoint/2010/main" val="3933104526"/>
+      </p:ext>
+    </p:extLst>
+  </p:cSld>
+  <p:clrMapOvr>
+    <a:masterClrMapping/>
+  </p:clrMapOvr>
+</p:notes>
+</file>
+
+<file path=ppt/notesSlides/notesSlide6.xml><?xml version="1.0" encoding="utf-8"?>
+<p:notes xmlns:a="http://schemas.openxmlformats.org/drawingml/2006/main" xmlns:r="http://schemas.openxmlformats.org/officeDocument/2006/relationships" xmlns:p="http://schemas.openxmlformats.org/presentationml/2006/main">
+  <p:cSld>
+    <p:spTree>
+      <p:nvGrpSpPr>
+        <p:cNvPr id="1" name=""/>
+        <p:cNvGrpSpPr/>
+        <p:nvPr/>
+      </p:nvGrpSpPr>
+      <p:grpSpPr>
+        <a:xfrm>
+          <a:off x="0" y="0"/>
+          <a:ext cx="0" cy="0"/>
+          <a:chOff x="0" y="0"/>
+          <a:chExt cx="0" cy="0"/>
+        </a:xfrm>
+      </p:grpSpPr>
+      <p:sp>
+        <p:nvSpPr>
+          <p:cNvPr id="2" name="Marcador de imagen de diapositiva 1"/>
+          <p:cNvSpPr>
+            <a:spLocks noGrp="1" noRot="1" noChangeAspect="1"/>
+          </p:cNvSpPr>
+          <p:nvPr>
+            <p:ph type="sldImg"/>
+          </p:nvPr>
+        </p:nvSpPr>
+        <p:spPr/>
+      </p:sp>
+      <p:sp>
+        <p:nvSpPr>
+          <p:cNvPr id="3" name="Marcador de notas 2"/>
+          <p:cNvSpPr>
+            <a:spLocks noGrp="1"/>
+          </p:cNvSpPr>
+          <p:nvPr>
+            <p:ph type="body" idx="1"/>
+          </p:nvPr>
+        </p:nvSpPr>
+        <p:spPr/>
+        <p:txBody>
+          <a:bodyPr/>
+          <a:lstStyle/>
+          <a:p>
+            <a:r>
+              <a:rPr lang="es-CO" dirty="0"/>
+              <a:t>Prevalencia en mujeres siempre es mayor </a:t>
+            </a:r>
+          </a:p>
+        </p:txBody>
+      </p:sp>
+      <p:sp>
+        <p:nvSpPr>
+          <p:cNvPr id="4" name="Marcador de número de diapositiva 3"/>
+          <p:cNvSpPr>
+            <a:spLocks noGrp="1"/>
+          </p:cNvSpPr>
+          <p:nvPr>
+            <p:ph type="sldNum" sz="quarter" idx="5"/>
+          </p:nvPr>
+        </p:nvSpPr>
+        <p:spPr/>
+        <p:txBody>
+          <a:bodyPr/>
+          <a:lstStyle/>
+          <a:p>
+            <a:fld id="{2B283FB9-E709-4212-8B1A-33278A85FB33}" type="slidenum">
+              <a:rPr lang="es-CO" smtClean="0"/>
+              <a:t>8</a:t>
+            </a:fld>
+            <a:endParaRPr lang="es-CO"/>
+          </a:p>
+        </p:txBody>
+      </p:sp>
+    </p:spTree>
+    <p:extLst>
+      <p:ext uri="{BB962C8B-B14F-4D97-AF65-F5344CB8AC3E}">
+        <p14:creationId xmlns:p14="http://schemas.microsoft.com/office/powerpoint/2010/main" val="958818534"/>
+      </p:ext>
+    </p:extLst>
+  </p:cSld>
+  <p:clrMapOvr>
+    <a:masterClrMapping/>
+  </p:clrMapOvr>
+</p:notes>
+</file>
+
+<file path=ppt/notesSlides/notesSlide7.xml><?xml version="1.0" encoding="utf-8"?>
+<p:notes xmlns:a="http://schemas.openxmlformats.org/drawingml/2006/main" xmlns:r="http://schemas.openxmlformats.org/officeDocument/2006/relationships" xmlns:p="http://schemas.openxmlformats.org/presentationml/2006/main">
+  <p:cSld>
+    <p:spTree>
+      <p:nvGrpSpPr>
+        <p:cNvPr id="1" name=""/>
+        <p:cNvGrpSpPr/>
+        <p:nvPr/>
+      </p:nvGrpSpPr>
+      <p:grpSpPr>
+        <a:xfrm>
+          <a:off x="0" y="0"/>
+          <a:ext cx="0" cy="0"/>
+          <a:chOff x="0" y="0"/>
+          <a:chExt cx="0" cy="0"/>
+        </a:xfrm>
+      </p:grpSpPr>
+      <p:sp>
+        <p:nvSpPr>
+          <p:cNvPr id="2" name="Marcador de imagen de diapositiva 1"/>
+          <p:cNvSpPr>
+            <a:spLocks noGrp="1" noRot="1" noChangeAspect="1"/>
+          </p:cNvSpPr>
+          <p:nvPr>
+            <p:ph type="sldImg"/>
+          </p:nvPr>
+        </p:nvSpPr>
+        <p:spPr/>
+      </p:sp>
+      <p:sp>
+        <p:nvSpPr>
+          <p:cNvPr id="3" name="Marcador de notas 2"/>
+          <p:cNvSpPr>
+            <a:spLocks noGrp="1"/>
+          </p:cNvSpPr>
+          <p:nvPr>
+            <p:ph type="body" idx="1"/>
+          </p:nvPr>
+        </p:nvSpPr>
+        <p:spPr/>
+        <p:txBody>
+          <a:bodyPr/>
+          <a:lstStyle/>
+          <a:p>
+            <a:r>
+              <a:rPr lang="es-CO" dirty="0" err="1"/>
+              <a:t>Extrarer</a:t>
+            </a:r>
+            <a:r>
+              <a:rPr lang="es-CO" dirty="0"/>
+              <a:t> los puntos NA de edad </a:t>
+            </a:r>
+          </a:p>
+        </p:txBody>
+      </p:sp>
+      <p:sp>
+        <p:nvSpPr>
+          <p:cNvPr id="4" name="Marcador de número de diapositiva 3"/>
+          <p:cNvSpPr>
+            <a:spLocks noGrp="1"/>
+          </p:cNvSpPr>
+          <p:nvPr>
+            <p:ph type="sldNum" sz="quarter" idx="5"/>
+          </p:nvPr>
+        </p:nvSpPr>
+        <p:spPr/>
+        <p:txBody>
+          <a:bodyPr/>
+          <a:lstStyle/>
+          <a:p>
+            <a:fld id="{2B283FB9-E709-4212-8B1A-33278A85FB33}" type="slidenum">
+              <a:rPr lang="es-CO" smtClean="0"/>
+              <a:t>12</a:t>
+            </a:fld>
+            <a:endParaRPr lang="es-CO"/>
+          </a:p>
+        </p:txBody>
+      </p:sp>
+    </p:spTree>
+    <p:extLst>
+      <p:ext uri="{BB962C8B-B14F-4D97-AF65-F5344CB8AC3E}">
+        <p14:creationId xmlns:p14="http://schemas.microsoft.com/office/powerpoint/2010/main" val="2724341159"/>
+      </p:ext>
+    </p:extLst>
+  </p:cSld>
+  <p:clrMapOvr>
+    <a:masterClrMapping/>
+  </p:clrMapOvr>
+</p:notes>
 </file>
 
 <file path=ppt/slideLayouts/slideLayout1.xml><?xml version="1.0" encoding="utf-8"?>
@@ -275,7 +1482,7 @@
           <a:p>
             <a:fld id="{70D2BE9D-4DFE-402A-853A-6E7B91741EE3}" type="datetimeFigureOut">
               <a:rPr lang="es-CO" smtClean="0"/>
-              <a:t>10/01/2024</a:t>
+              <a:t>22/01/2024</a:t>
             </a:fld>
             <a:endParaRPr lang="es-CO"/>
           </a:p>
@@ -475,7 +1682,7 @@
           <a:p>
             <a:fld id="{70D2BE9D-4DFE-402A-853A-6E7B91741EE3}" type="datetimeFigureOut">
               <a:rPr lang="es-CO" smtClean="0"/>
-              <a:t>10/01/2024</a:t>
+              <a:t>22/01/2024</a:t>
             </a:fld>
             <a:endParaRPr lang="es-CO"/>
           </a:p>
@@ -685,7 +1892,7 @@
           <a:p>
             <a:fld id="{70D2BE9D-4DFE-402A-853A-6E7B91741EE3}" type="datetimeFigureOut">
               <a:rPr lang="es-CO" smtClean="0"/>
-              <a:t>10/01/2024</a:t>
+              <a:t>22/01/2024</a:t>
             </a:fld>
             <a:endParaRPr lang="es-CO"/>
           </a:p>
@@ -885,7 +2092,7 @@
           <a:p>
             <a:fld id="{70D2BE9D-4DFE-402A-853A-6E7B91741EE3}" type="datetimeFigureOut">
               <a:rPr lang="es-CO" smtClean="0"/>
-              <a:t>10/01/2024</a:t>
+              <a:t>22/01/2024</a:t>
             </a:fld>
             <a:endParaRPr lang="es-CO"/>
           </a:p>
@@ -1161,7 +2368,7 @@
           <a:p>
             <a:fld id="{70D2BE9D-4DFE-402A-853A-6E7B91741EE3}" type="datetimeFigureOut">
               <a:rPr lang="es-CO" smtClean="0"/>
-              <a:t>10/01/2024</a:t>
+              <a:t>22/01/2024</a:t>
             </a:fld>
             <a:endParaRPr lang="es-CO"/>
           </a:p>
@@ -1429,7 +2636,7 @@
           <a:p>
             <a:fld id="{70D2BE9D-4DFE-402A-853A-6E7B91741EE3}" type="datetimeFigureOut">
               <a:rPr lang="es-CO" smtClean="0"/>
-              <a:t>10/01/2024</a:t>
+              <a:t>22/01/2024</a:t>
             </a:fld>
             <a:endParaRPr lang="es-CO"/>
           </a:p>
@@ -1844,7 +3051,7 @@
           <a:p>
             <a:fld id="{70D2BE9D-4DFE-402A-853A-6E7B91741EE3}" type="datetimeFigureOut">
               <a:rPr lang="es-CO" smtClean="0"/>
-              <a:t>10/01/2024</a:t>
+              <a:t>22/01/2024</a:t>
             </a:fld>
             <a:endParaRPr lang="es-CO"/>
           </a:p>
@@ -1986,7 +3193,7 @@
           <a:p>
             <a:fld id="{70D2BE9D-4DFE-402A-853A-6E7B91741EE3}" type="datetimeFigureOut">
               <a:rPr lang="es-CO" smtClean="0"/>
-              <a:t>10/01/2024</a:t>
+              <a:t>22/01/2024</a:t>
             </a:fld>
             <a:endParaRPr lang="es-CO"/>
           </a:p>
@@ -2099,7 +3306,7 @@
           <a:p>
             <a:fld id="{70D2BE9D-4DFE-402A-853A-6E7B91741EE3}" type="datetimeFigureOut">
               <a:rPr lang="es-CO" smtClean="0"/>
-              <a:t>10/01/2024</a:t>
+              <a:t>22/01/2024</a:t>
             </a:fld>
             <a:endParaRPr lang="es-CO"/>
           </a:p>
@@ -2412,7 +3619,7 @@
           <a:p>
             <a:fld id="{70D2BE9D-4DFE-402A-853A-6E7B91741EE3}" type="datetimeFigureOut">
               <a:rPr lang="es-CO" smtClean="0"/>
-              <a:t>10/01/2024</a:t>
+              <a:t>22/01/2024</a:t>
             </a:fld>
             <a:endParaRPr lang="es-CO"/>
           </a:p>
@@ -2701,7 +3908,7 @@
           <a:p>
             <a:fld id="{70D2BE9D-4DFE-402A-853A-6E7B91741EE3}" type="datetimeFigureOut">
               <a:rPr lang="es-CO" smtClean="0"/>
-              <a:t>10/01/2024</a:t>
+              <a:t>22/01/2024</a:t>
             </a:fld>
             <a:endParaRPr lang="es-CO"/>
           </a:p>
@@ -2944,7 +4151,7 @@
           <a:p>
             <a:fld id="{70D2BE9D-4DFE-402A-853A-6E7B91741EE3}" type="datetimeFigureOut">
               <a:rPr lang="es-CO" smtClean="0"/>
-              <a:t>10/01/2024</a:t>
+              <a:t>22/01/2024</a:t>
             </a:fld>
             <a:endParaRPr lang="es-CO"/>
           </a:p>
@@ -3560,7 +4767,7 @@
           <p:nvPr/>
         </p:nvPicPr>
         <p:blipFill>
-          <a:blip r:embed="rId2"/>
+          <a:blip r:embed="rId3"/>
           <a:stretch>
             <a:fillRect/>
           </a:stretch>
@@ -3864,7 +5071,7 @@
           <p:nvPr/>
         </p:nvPicPr>
         <p:blipFill>
-          <a:blip r:embed="rId3">
+          <a:blip r:embed="rId2">
             <a:extLst>
               <a:ext uri="{28A0092B-C50C-407E-A947-70E740481C1C}">
                 <a14:useLocalDpi xmlns:a14="http://schemas.microsoft.com/office/drawing/2010/main" val="0"/>
@@ -3883,6 +5090,758 @@
           <a:prstGeom prst="rect">
             <a:avLst/>
           </a:prstGeom>
+        </p:spPr>
+      </p:pic>
+      <p:pic>
+        <p:nvPicPr>
+          <p:cNvPr id="1026" name="Picture 2">
+            <a:extLst>
+              <a:ext uri="{FF2B5EF4-FFF2-40B4-BE49-F238E27FC236}">
+                <a16:creationId xmlns:a16="http://schemas.microsoft.com/office/drawing/2014/main" id="{045AF5EE-377E-5CA8-085A-EA4B45AE3ED2}"/>
+              </a:ext>
+            </a:extLst>
+          </p:cNvPr>
+          <p:cNvPicPr>
+            <a:picLocks noChangeAspect="1" noChangeArrowheads="1"/>
+          </p:cNvPicPr>
+          <p:nvPr/>
+        </p:nvPicPr>
+        <p:blipFill>
+          <a:blip r:embed="rId3">
+            <a:extLst>
+              <a:ext uri="{28A0092B-C50C-407E-A947-70E740481C1C}">
+                <a14:useLocalDpi xmlns:a14="http://schemas.microsoft.com/office/drawing/2010/main" val="0"/>
+              </a:ext>
+            </a:extLst>
+          </a:blip>
+          <a:srcRect/>
+          <a:stretch>
+            <a:fillRect/>
+          </a:stretch>
+        </p:blipFill>
+        <p:spPr bwMode="auto">
+          <a:xfrm>
+            <a:off x="0" y="0"/>
+            <a:ext cx="4876800" cy="4876800"/>
+          </a:xfrm>
+          <a:prstGeom prst="rect">
+            <a:avLst/>
+          </a:prstGeom>
+          <a:noFill/>
+          <a:extLst>
+            <a:ext uri="{909E8E84-426E-40DD-AFC4-6F175D3DCCD1}">
+              <a14:hiddenFill xmlns:a14="http://schemas.microsoft.com/office/drawing/2010/main">
+                <a:solidFill>
+                  <a:srgbClr val="FFFFFF"/>
+                </a:solidFill>
+              </a14:hiddenFill>
+            </a:ext>
+          </a:extLst>
+        </p:spPr>
+      </p:pic>
+      <p:pic>
+        <p:nvPicPr>
+          <p:cNvPr id="1027" name="Picture 3">
+            <a:extLst>
+              <a:ext uri="{FF2B5EF4-FFF2-40B4-BE49-F238E27FC236}">
+                <a16:creationId xmlns:a16="http://schemas.microsoft.com/office/drawing/2014/main" id="{CC542BF3-8A62-C529-DFC2-B29DBFA2A147}"/>
+              </a:ext>
+            </a:extLst>
+          </p:cNvPr>
+          <p:cNvPicPr>
+            <a:picLocks noChangeAspect="1" noChangeArrowheads="1"/>
+          </p:cNvPicPr>
+          <p:nvPr/>
+        </p:nvPicPr>
+        <p:blipFill>
+          <a:blip r:embed="rId4">
+            <a:extLst>
+              <a:ext uri="{28A0092B-C50C-407E-A947-70E740481C1C}">
+                <a14:useLocalDpi xmlns:a14="http://schemas.microsoft.com/office/drawing/2010/main" val="0"/>
+              </a:ext>
+            </a:extLst>
+          </a:blip>
+          <a:srcRect/>
+          <a:stretch>
+            <a:fillRect/>
+          </a:stretch>
+        </p:blipFill>
+        <p:spPr bwMode="auto">
+          <a:xfrm>
+            <a:off x="0" y="0"/>
+            <a:ext cx="4876800" cy="4876800"/>
+          </a:xfrm>
+          <a:prstGeom prst="rect">
+            <a:avLst/>
+          </a:prstGeom>
+          <a:noFill/>
+          <a:extLst>
+            <a:ext uri="{909E8E84-426E-40DD-AFC4-6F175D3DCCD1}">
+              <a14:hiddenFill xmlns:a14="http://schemas.microsoft.com/office/drawing/2010/main">
+                <a:solidFill>
+                  <a:srgbClr val="FFFFFF"/>
+                </a:solidFill>
+              </a14:hiddenFill>
+            </a:ext>
+          </a:extLst>
+        </p:spPr>
+      </p:pic>
+      <p:pic>
+        <p:nvPicPr>
+          <p:cNvPr id="1028" name="Picture 4">
+            <a:extLst>
+              <a:ext uri="{FF2B5EF4-FFF2-40B4-BE49-F238E27FC236}">
+                <a16:creationId xmlns:a16="http://schemas.microsoft.com/office/drawing/2014/main" id="{70A108A7-8520-61F2-D033-9996CFAB3BD5}"/>
+              </a:ext>
+            </a:extLst>
+          </p:cNvPr>
+          <p:cNvPicPr>
+            <a:picLocks noChangeAspect="1" noChangeArrowheads="1"/>
+          </p:cNvPicPr>
+          <p:nvPr/>
+        </p:nvPicPr>
+        <p:blipFill>
+          <a:blip r:embed="rId5">
+            <a:extLst>
+              <a:ext uri="{28A0092B-C50C-407E-A947-70E740481C1C}">
+                <a14:useLocalDpi xmlns:a14="http://schemas.microsoft.com/office/drawing/2010/main" val="0"/>
+              </a:ext>
+            </a:extLst>
+          </a:blip>
+          <a:srcRect/>
+          <a:stretch>
+            <a:fillRect/>
+          </a:stretch>
+        </p:blipFill>
+        <p:spPr bwMode="auto">
+          <a:xfrm>
+            <a:off x="0" y="0"/>
+            <a:ext cx="4876800" cy="4876800"/>
+          </a:xfrm>
+          <a:prstGeom prst="rect">
+            <a:avLst/>
+          </a:prstGeom>
+          <a:noFill/>
+          <a:extLst>
+            <a:ext uri="{909E8E84-426E-40DD-AFC4-6F175D3DCCD1}">
+              <a14:hiddenFill xmlns:a14="http://schemas.microsoft.com/office/drawing/2010/main">
+                <a:solidFill>
+                  <a:srgbClr val="FFFFFF"/>
+                </a:solidFill>
+              </a14:hiddenFill>
+            </a:ext>
+          </a:extLst>
+        </p:spPr>
+      </p:pic>
+      <p:pic>
+        <p:nvPicPr>
+          <p:cNvPr id="1029" name="Picture 5">
+            <a:extLst>
+              <a:ext uri="{FF2B5EF4-FFF2-40B4-BE49-F238E27FC236}">
+                <a16:creationId xmlns:a16="http://schemas.microsoft.com/office/drawing/2014/main" id="{2F779F4B-9972-99BF-70EE-1D59AF0DAD68}"/>
+              </a:ext>
+            </a:extLst>
+          </p:cNvPr>
+          <p:cNvPicPr>
+            <a:picLocks noChangeAspect="1" noChangeArrowheads="1"/>
+          </p:cNvPicPr>
+          <p:nvPr/>
+        </p:nvPicPr>
+        <p:blipFill>
+          <a:blip r:embed="rId6">
+            <a:extLst>
+              <a:ext uri="{28A0092B-C50C-407E-A947-70E740481C1C}">
+                <a14:useLocalDpi xmlns:a14="http://schemas.microsoft.com/office/drawing/2010/main" val="0"/>
+              </a:ext>
+            </a:extLst>
+          </a:blip>
+          <a:srcRect/>
+          <a:stretch>
+            <a:fillRect/>
+          </a:stretch>
+        </p:blipFill>
+        <p:spPr bwMode="auto">
+          <a:xfrm>
+            <a:off x="0" y="0"/>
+            <a:ext cx="4876800" cy="4876800"/>
+          </a:xfrm>
+          <a:prstGeom prst="rect">
+            <a:avLst/>
+          </a:prstGeom>
+          <a:noFill/>
+          <a:extLst>
+            <a:ext uri="{909E8E84-426E-40DD-AFC4-6F175D3DCCD1}">
+              <a14:hiddenFill xmlns:a14="http://schemas.microsoft.com/office/drawing/2010/main">
+                <a:solidFill>
+                  <a:srgbClr val="FFFFFF"/>
+                </a:solidFill>
+              </a14:hiddenFill>
+            </a:ext>
+          </a:extLst>
+        </p:spPr>
+      </p:pic>
+      <p:pic>
+        <p:nvPicPr>
+          <p:cNvPr id="1030" name="Picture 6">
+            <a:extLst>
+              <a:ext uri="{FF2B5EF4-FFF2-40B4-BE49-F238E27FC236}">
+                <a16:creationId xmlns:a16="http://schemas.microsoft.com/office/drawing/2014/main" id="{B84F5F45-7A30-054F-A74D-54B050357F49}"/>
+              </a:ext>
+            </a:extLst>
+          </p:cNvPr>
+          <p:cNvPicPr>
+            <a:picLocks noChangeAspect="1" noChangeArrowheads="1"/>
+          </p:cNvPicPr>
+          <p:nvPr/>
+        </p:nvPicPr>
+        <p:blipFill>
+          <a:blip r:embed="rId7">
+            <a:extLst>
+              <a:ext uri="{28A0092B-C50C-407E-A947-70E740481C1C}">
+                <a14:useLocalDpi xmlns:a14="http://schemas.microsoft.com/office/drawing/2010/main" val="0"/>
+              </a:ext>
+            </a:extLst>
+          </a:blip>
+          <a:srcRect/>
+          <a:stretch>
+            <a:fillRect/>
+          </a:stretch>
+        </p:blipFill>
+        <p:spPr bwMode="auto">
+          <a:xfrm>
+            <a:off x="0" y="0"/>
+            <a:ext cx="4876800" cy="4876800"/>
+          </a:xfrm>
+          <a:prstGeom prst="rect">
+            <a:avLst/>
+          </a:prstGeom>
+          <a:noFill/>
+          <a:extLst>
+            <a:ext uri="{909E8E84-426E-40DD-AFC4-6F175D3DCCD1}">
+              <a14:hiddenFill xmlns:a14="http://schemas.microsoft.com/office/drawing/2010/main">
+                <a:solidFill>
+                  <a:srgbClr val="FFFFFF"/>
+                </a:solidFill>
+              </a14:hiddenFill>
+            </a:ext>
+          </a:extLst>
+        </p:spPr>
+      </p:pic>
+      <p:pic>
+        <p:nvPicPr>
+          <p:cNvPr id="1031" name="Picture 7">
+            <a:extLst>
+              <a:ext uri="{FF2B5EF4-FFF2-40B4-BE49-F238E27FC236}">
+                <a16:creationId xmlns:a16="http://schemas.microsoft.com/office/drawing/2014/main" id="{BB2EF229-FA37-1A64-A321-39F1C8AB410F}"/>
+              </a:ext>
+            </a:extLst>
+          </p:cNvPr>
+          <p:cNvPicPr>
+            <a:picLocks noChangeAspect="1" noChangeArrowheads="1"/>
+          </p:cNvPicPr>
+          <p:nvPr/>
+        </p:nvPicPr>
+        <p:blipFill>
+          <a:blip r:embed="rId8">
+            <a:extLst>
+              <a:ext uri="{28A0092B-C50C-407E-A947-70E740481C1C}">
+                <a14:useLocalDpi xmlns:a14="http://schemas.microsoft.com/office/drawing/2010/main" val="0"/>
+              </a:ext>
+            </a:extLst>
+          </a:blip>
+          <a:srcRect/>
+          <a:stretch>
+            <a:fillRect/>
+          </a:stretch>
+        </p:blipFill>
+        <p:spPr bwMode="auto">
+          <a:xfrm>
+            <a:off x="0" y="0"/>
+            <a:ext cx="4876800" cy="4876800"/>
+          </a:xfrm>
+          <a:prstGeom prst="rect">
+            <a:avLst/>
+          </a:prstGeom>
+          <a:noFill/>
+          <a:extLst>
+            <a:ext uri="{909E8E84-426E-40DD-AFC4-6F175D3DCCD1}">
+              <a14:hiddenFill xmlns:a14="http://schemas.microsoft.com/office/drawing/2010/main">
+                <a:solidFill>
+                  <a:srgbClr val="FFFFFF"/>
+                </a:solidFill>
+              </a14:hiddenFill>
+            </a:ext>
+          </a:extLst>
+        </p:spPr>
+      </p:pic>
+      <p:pic>
+        <p:nvPicPr>
+          <p:cNvPr id="1032" name="Picture 8">
+            <a:extLst>
+              <a:ext uri="{FF2B5EF4-FFF2-40B4-BE49-F238E27FC236}">
+                <a16:creationId xmlns:a16="http://schemas.microsoft.com/office/drawing/2014/main" id="{2710BAC5-5E69-255C-9304-1B95461057C9}"/>
+              </a:ext>
+            </a:extLst>
+          </p:cNvPr>
+          <p:cNvPicPr>
+            <a:picLocks noChangeAspect="1" noChangeArrowheads="1"/>
+          </p:cNvPicPr>
+          <p:nvPr/>
+        </p:nvPicPr>
+        <p:blipFill>
+          <a:blip r:embed="rId9">
+            <a:extLst>
+              <a:ext uri="{28A0092B-C50C-407E-A947-70E740481C1C}">
+                <a14:useLocalDpi xmlns:a14="http://schemas.microsoft.com/office/drawing/2010/main" val="0"/>
+              </a:ext>
+            </a:extLst>
+          </a:blip>
+          <a:srcRect/>
+          <a:stretch>
+            <a:fillRect/>
+          </a:stretch>
+        </p:blipFill>
+        <p:spPr bwMode="auto">
+          <a:xfrm>
+            <a:off x="0" y="0"/>
+            <a:ext cx="4876800" cy="4876800"/>
+          </a:xfrm>
+          <a:prstGeom prst="rect">
+            <a:avLst/>
+          </a:prstGeom>
+          <a:noFill/>
+          <a:extLst>
+            <a:ext uri="{909E8E84-426E-40DD-AFC4-6F175D3DCCD1}">
+              <a14:hiddenFill xmlns:a14="http://schemas.microsoft.com/office/drawing/2010/main">
+                <a:solidFill>
+                  <a:srgbClr val="FFFFFF"/>
+                </a:solidFill>
+              </a14:hiddenFill>
+            </a:ext>
+          </a:extLst>
+        </p:spPr>
+      </p:pic>
+      <p:pic>
+        <p:nvPicPr>
+          <p:cNvPr id="1033" name="Picture 9">
+            <a:extLst>
+              <a:ext uri="{FF2B5EF4-FFF2-40B4-BE49-F238E27FC236}">
+                <a16:creationId xmlns:a16="http://schemas.microsoft.com/office/drawing/2014/main" id="{2AC867E3-FA8E-F4E8-AC4B-AE890DE0E3D4}"/>
+              </a:ext>
+            </a:extLst>
+          </p:cNvPr>
+          <p:cNvPicPr>
+            <a:picLocks noChangeAspect="1" noChangeArrowheads="1"/>
+          </p:cNvPicPr>
+          <p:nvPr/>
+        </p:nvPicPr>
+        <p:blipFill>
+          <a:blip r:embed="rId10">
+            <a:extLst>
+              <a:ext uri="{28A0092B-C50C-407E-A947-70E740481C1C}">
+                <a14:useLocalDpi xmlns:a14="http://schemas.microsoft.com/office/drawing/2010/main" val="0"/>
+              </a:ext>
+            </a:extLst>
+          </a:blip>
+          <a:srcRect/>
+          <a:stretch>
+            <a:fillRect/>
+          </a:stretch>
+        </p:blipFill>
+        <p:spPr bwMode="auto">
+          <a:xfrm>
+            <a:off x="0" y="0"/>
+            <a:ext cx="4876800" cy="4876800"/>
+          </a:xfrm>
+          <a:prstGeom prst="rect">
+            <a:avLst/>
+          </a:prstGeom>
+          <a:noFill/>
+          <a:extLst>
+            <a:ext uri="{909E8E84-426E-40DD-AFC4-6F175D3DCCD1}">
+              <a14:hiddenFill xmlns:a14="http://schemas.microsoft.com/office/drawing/2010/main">
+                <a:solidFill>
+                  <a:srgbClr val="FFFFFF"/>
+                </a:solidFill>
+              </a14:hiddenFill>
+            </a:ext>
+          </a:extLst>
+        </p:spPr>
+      </p:pic>
+      <p:pic>
+        <p:nvPicPr>
+          <p:cNvPr id="1034" name="Picture 10">
+            <a:extLst>
+              <a:ext uri="{FF2B5EF4-FFF2-40B4-BE49-F238E27FC236}">
+                <a16:creationId xmlns:a16="http://schemas.microsoft.com/office/drawing/2014/main" id="{B28714BB-D797-6DB8-0FCF-A387BCA2AE62}"/>
+              </a:ext>
+            </a:extLst>
+          </p:cNvPr>
+          <p:cNvPicPr>
+            <a:picLocks noChangeAspect="1" noChangeArrowheads="1"/>
+          </p:cNvPicPr>
+          <p:nvPr/>
+        </p:nvPicPr>
+        <p:blipFill>
+          <a:blip r:embed="rId11">
+            <a:extLst>
+              <a:ext uri="{28A0092B-C50C-407E-A947-70E740481C1C}">
+                <a14:useLocalDpi xmlns:a14="http://schemas.microsoft.com/office/drawing/2010/main" val="0"/>
+              </a:ext>
+            </a:extLst>
+          </a:blip>
+          <a:srcRect/>
+          <a:stretch>
+            <a:fillRect/>
+          </a:stretch>
+        </p:blipFill>
+        <p:spPr bwMode="auto">
+          <a:xfrm>
+            <a:off x="0" y="0"/>
+            <a:ext cx="4876800" cy="4876800"/>
+          </a:xfrm>
+          <a:prstGeom prst="rect">
+            <a:avLst/>
+          </a:prstGeom>
+          <a:noFill/>
+          <a:extLst>
+            <a:ext uri="{909E8E84-426E-40DD-AFC4-6F175D3DCCD1}">
+              <a14:hiddenFill xmlns:a14="http://schemas.microsoft.com/office/drawing/2010/main">
+                <a:solidFill>
+                  <a:srgbClr val="FFFFFF"/>
+                </a:solidFill>
+              </a14:hiddenFill>
+            </a:ext>
+          </a:extLst>
+        </p:spPr>
+      </p:pic>
+      <p:pic>
+        <p:nvPicPr>
+          <p:cNvPr id="1035" name="Picture 11">
+            <a:extLst>
+              <a:ext uri="{FF2B5EF4-FFF2-40B4-BE49-F238E27FC236}">
+                <a16:creationId xmlns:a16="http://schemas.microsoft.com/office/drawing/2014/main" id="{9921090B-6DB2-2571-FB47-9BBCA073A192}"/>
+              </a:ext>
+            </a:extLst>
+          </p:cNvPr>
+          <p:cNvPicPr>
+            <a:picLocks noChangeAspect="1" noChangeArrowheads="1"/>
+          </p:cNvPicPr>
+          <p:nvPr/>
+        </p:nvPicPr>
+        <p:blipFill>
+          <a:blip r:embed="rId12">
+            <a:extLst>
+              <a:ext uri="{28A0092B-C50C-407E-A947-70E740481C1C}">
+                <a14:useLocalDpi xmlns:a14="http://schemas.microsoft.com/office/drawing/2010/main" val="0"/>
+              </a:ext>
+            </a:extLst>
+          </a:blip>
+          <a:srcRect/>
+          <a:stretch>
+            <a:fillRect/>
+          </a:stretch>
+        </p:blipFill>
+        <p:spPr bwMode="auto">
+          <a:xfrm>
+            <a:off x="0" y="0"/>
+            <a:ext cx="4876800" cy="4876800"/>
+          </a:xfrm>
+          <a:prstGeom prst="rect">
+            <a:avLst/>
+          </a:prstGeom>
+          <a:noFill/>
+          <a:extLst>
+            <a:ext uri="{909E8E84-426E-40DD-AFC4-6F175D3DCCD1}">
+              <a14:hiddenFill xmlns:a14="http://schemas.microsoft.com/office/drawing/2010/main">
+                <a:solidFill>
+                  <a:srgbClr val="FFFFFF"/>
+                </a:solidFill>
+              </a14:hiddenFill>
+            </a:ext>
+          </a:extLst>
+        </p:spPr>
+      </p:pic>
+      <p:pic>
+        <p:nvPicPr>
+          <p:cNvPr id="1036" name="Picture 12">
+            <a:extLst>
+              <a:ext uri="{FF2B5EF4-FFF2-40B4-BE49-F238E27FC236}">
+                <a16:creationId xmlns:a16="http://schemas.microsoft.com/office/drawing/2014/main" id="{999540F1-0C97-76FB-52B6-FC031B1DF42A}"/>
+              </a:ext>
+            </a:extLst>
+          </p:cNvPr>
+          <p:cNvPicPr>
+            <a:picLocks noChangeAspect="1" noChangeArrowheads="1"/>
+          </p:cNvPicPr>
+          <p:nvPr/>
+        </p:nvPicPr>
+        <p:blipFill>
+          <a:blip r:embed="rId13">
+            <a:extLst>
+              <a:ext uri="{28A0092B-C50C-407E-A947-70E740481C1C}">
+                <a14:useLocalDpi xmlns:a14="http://schemas.microsoft.com/office/drawing/2010/main" val="0"/>
+              </a:ext>
+            </a:extLst>
+          </a:blip>
+          <a:srcRect/>
+          <a:stretch>
+            <a:fillRect/>
+          </a:stretch>
+        </p:blipFill>
+        <p:spPr bwMode="auto">
+          <a:xfrm>
+            <a:off x="0" y="0"/>
+            <a:ext cx="4876800" cy="4876800"/>
+          </a:xfrm>
+          <a:prstGeom prst="rect">
+            <a:avLst/>
+          </a:prstGeom>
+          <a:noFill/>
+          <a:extLst>
+            <a:ext uri="{909E8E84-426E-40DD-AFC4-6F175D3DCCD1}">
+              <a14:hiddenFill xmlns:a14="http://schemas.microsoft.com/office/drawing/2010/main">
+                <a:solidFill>
+                  <a:srgbClr val="FFFFFF"/>
+                </a:solidFill>
+              </a14:hiddenFill>
+            </a:ext>
+          </a:extLst>
+        </p:spPr>
+      </p:pic>
+      <p:pic>
+        <p:nvPicPr>
+          <p:cNvPr id="1037" name="Picture 13">
+            <a:extLst>
+              <a:ext uri="{FF2B5EF4-FFF2-40B4-BE49-F238E27FC236}">
+                <a16:creationId xmlns:a16="http://schemas.microsoft.com/office/drawing/2014/main" id="{78FC1EE0-DF18-68FB-7630-14789ACEAC91}"/>
+              </a:ext>
+            </a:extLst>
+          </p:cNvPr>
+          <p:cNvPicPr>
+            <a:picLocks noChangeAspect="1" noChangeArrowheads="1"/>
+          </p:cNvPicPr>
+          <p:nvPr/>
+        </p:nvPicPr>
+        <p:blipFill>
+          <a:blip r:embed="rId14">
+            <a:extLst>
+              <a:ext uri="{28A0092B-C50C-407E-A947-70E740481C1C}">
+                <a14:useLocalDpi xmlns:a14="http://schemas.microsoft.com/office/drawing/2010/main" val="0"/>
+              </a:ext>
+            </a:extLst>
+          </a:blip>
+          <a:srcRect/>
+          <a:stretch>
+            <a:fillRect/>
+          </a:stretch>
+        </p:blipFill>
+        <p:spPr bwMode="auto">
+          <a:xfrm>
+            <a:off x="0" y="0"/>
+            <a:ext cx="4876800" cy="4876800"/>
+          </a:xfrm>
+          <a:prstGeom prst="rect">
+            <a:avLst/>
+          </a:prstGeom>
+          <a:noFill/>
+          <a:extLst>
+            <a:ext uri="{909E8E84-426E-40DD-AFC4-6F175D3DCCD1}">
+              <a14:hiddenFill xmlns:a14="http://schemas.microsoft.com/office/drawing/2010/main">
+                <a:solidFill>
+                  <a:srgbClr val="FFFFFF"/>
+                </a:solidFill>
+              </a14:hiddenFill>
+            </a:ext>
+          </a:extLst>
+        </p:spPr>
+      </p:pic>
+      <p:pic>
+        <p:nvPicPr>
+          <p:cNvPr id="1038" name="Picture 14">
+            <a:extLst>
+              <a:ext uri="{FF2B5EF4-FFF2-40B4-BE49-F238E27FC236}">
+                <a16:creationId xmlns:a16="http://schemas.microsoft.com/office/drawing/2014/main" id="{320DDB73-52FA-E756-0C9C-194A913F7728}"/>
+              </a:ext>
+            </a:extLst>
+          </p:cNvPr>
+          <p:cNvPicPr>
+            <a:picLocks noChangeAspect="1" noChangeArrowheads="1"/>
+          </p:cNvPicPr>
+          <p:nvPr/>
+        </p:nvPicPr>
+        <p:blipFill>
+          <a:blip r:embed="rId15">
+            <a:extLst>
+              <a:ext uri="{28A0092B-C50C-407E-A947-70E740481C1C}">
+                <a14:useLocalDpi xmlns:a14="http://schemas.microsoft.com/office/drawing/2010/main" val="0"/>
+              </a:ext>
+            </a:extLst>
+          </a:blip>
+          <a:srcRect/>
+          <a:stretch>
+            <a:fillRect/>
+          </a:stretch>
+        </p:blipFill>
+        <p:spPr bwMode="auto">
+          <a:xfrm>
+            <a:off x="0" y="0"/>
+            <a:ext cx="4876800" cy="4876800"/>
+          </a:xfrm>
+          <a:prstGeom prst="rect">
+            <a:avLst/>
+          </a:prstGeom>
+          <a:noFill/>
+          <a:extLst>
+            <a:ext uri="{909E8E84-426E-40DD-AFC4-6F175D3DCCD1}">
+              <a14:hiddenFill xmlns:a14="http://schemas.microsoft.com/office/drawing/2010/main">
+                <a:solidFill>
+                  <a:srgbClr val="FFFFFF"/>
+                </a:solidFill>
+              </a14:hiddenFill>
+            </a:ext>
+          </a:extLst>
+        </p:spPr>
+      </p:pic>
+      <p:pic>
+        <p:nvPicPr>
+          <p:cNvPr id="1039" name="Picture 15">
+            <a:extLst>
+              <a:ext uri="{FF2B5EF4-FFF2-40B4-BE49-F238E27FC236}">
+                <a16:creationId xmlns:a16="http://schemas.microsoft.com/office/drawing/2014/main" id="{9E7AF59D-5946-E1D9-A088-B70B537463A1}"/>
+              </a:ext>
+            </a:extLst>
+          </p:cNvPr>
+          <p:cNvPicPr>
+            <a:picLocks noChangeAspect="1" noChangeArrowheads="1"/>
+          </p:cNvPicPr>
+          <p:nvPr/>
+        </p:nvPicPr>
+        <p:blipFill>
+          <a:blip r:embed="rId16">
+            <a:extLst>
+              <a:ext uri="{28A0092B-C50C-407E-A947-70E740481C1C}">
+                <a14:useLocalDpi xmlns:a14="http://schemas.microsoft.com/office/drawing/2010/main" val="0"/>
+              </a:ext>
+            </a:extLst>
+          </a:blip>
+          <a:srcRect/>
+          <a:stretch>
+            <a:fillRect/>
+          </a:stretch>
+        </p:blipFill>
+        <p:spPr bwMode="auto">
+          <a:xfrm>
+            <a:off x="0" y="0"/>
+            <a:ext cx="4876800" cy="4876800"/>
+          </a:xfrm>
+          <a:prstGeom prst="rect">
+            <a:avLst/>
+          </a:prstGeom>
+          <a:noFill/>
+          <a:extLst>
+            <a:ext uri="{909E8E84-426E-40DD-AFC4-6F175D3DCCD1}">
+              <a14:hiddenFill xmlns:a14="http://schemas.microsoft.com/office/drawing/2010/main">
+                <a:solidFill>
+                  <a:srgbClr val="FFFFFF"/>
+                </a:solidFill>
+              </a14:hiddenFill>
+            </a:ext>
+          </a:extLst>
+        </p:spPr>
+      </p:pic>
+      <p:pic>
+        <p:nvPicPr>
+          <p:cNvPr id="1040" name="Picture 16">
+            <a:extLst>
+              <a:ext uri="{FF2B5EF4-FFF2-40B4-BE49-F238E27FC236}">
+                <a16:creationId xmlns:a16="http://schemas.microsoft.com/office/drawing/2014/main" id="{92B4F231-FFE8-8A1C-897B-9FABF322A5A3}"/>
+              </a:ext>
+            </a:extLst>
+          </p:cNvPr>
+          <p:cNvPicPr>
+            <a:picLocks noChangeAspect="1" noChangeArrowheads="1"/>
+          </p:cNvPicPr>
+          <p:nvPr/>
+        </p:nvPicPr>
+        <p:blipFill>
+          <a:blip r:embed="rId17">
+            <a:extLst>
+              <a:ext uri="{28A0092B-C50C-407E-A947-70E740481C1C}">
+                <a14:useLocalDpi xmlns:a14="http://schemas.microsoft.com/office/drawing/2010/main" val="0"/>
+              </a:ext>
+            </a:extLst>
+          </a:blip>
+          <a:srcRect/>
+          <a:stretch>
+            <a:fillRect/>
+          </a:stretch>
+        </p:blipFill>
+        <p:spPr bwMode="auto">
+          <a:xfrm>
+            <a:off x="0" y="0"/>
+            <a:ext cx="4876800" cy="4876800"/>
+          </a:xfrm>
+          <a:prstGeom prst="rect">
+            <a:avLst/>
+          </a:prstGeom>
+          <a:noFill/>
+          <a:extLst>
+            <a:ext uri="{909E8E84-426E-40DD-AFC4-6F175D3DCCD1}">
+              <a14:hiddenFill xmlns:a14="http://schemas.microsoft.com/office/drawing/2010/main">
+                <a:solidFill>
+                  <a:srgbClr val="FFFFFF"/>
+                </a:solidFill>
+              </a14:hiddenFill>
+            </a:ext>
+          </a:extLst>
+        </p:spPr>
+      </p:pic>
+      <p:pic>
+        <p:nvPicPr>
+          <p:cNvPr id="1041" name="Picture 17">
+            <a:extLst>
+              <a:ext uri="{FF2B5EF4-FFF2-40B4-BE49-F238E27FC236}">
+                <a16:creationId xmlns:a16="http://schemas.microsoft.com/office/drawing/2014/main" id="{912ED0A1-BAEB-D810-CB60-186BA3D92017}"/>
+              </a:ext>
+            </a:extLst>
+          </p:cNvPr>
+          <p:cNvPicPr>
+            <a:picLocks noChangeAspect="1" noChangeArrowheads="1"/>
+          </p:cNvPicPr>
+          <p:nvPr/>
+        </p:nvPicPr>
+        <p:blipFill>
+          <a:blip r:embed="rId18">
+            <a:extLst>
+              <a:ext uri="{28A0092B-C50C-407E-A947-70E740481C1C}">
+                <a14:useLocalDpi xmlns:a14="http://schemas.microsoft.com/office/drawing/2010/main" val="0"/>
+              </a:ext>
+            </a:extLst>
+          </a:blip>
+          <a:srcRect/>
+          <a:stretch>
+            <a:fillRect/>
+          </a:stretch>
+        </p:blipFill>
+        <p:spPr bwMode="auto">
+          <a:xfrm>
+            <a:off x="0" y="0"/>
+            <a:ext cx="4876800" cy="4876800"/>
+          </a:xfrm>
+          <a:prstGeom prst="rect">
+            <a:avLst/>
+          </a:prstGeom>
+          <a:noFill/>
+          <a:extLst>
+            <a:ext uri="{909E8E84-426E-40DD-AFC4-6F175D3DCCD1}">
+              <a14:hiddenFill xmlns:a14="http://schemas.microsoft.com/office/drawing/2010/main">
+                <a:solidFill>
+                  <a:srgbClr val="FFFFFF"/>
+                </a:solidFill>
+              </a14:hiddenFill>
+            </a:ext>
+          </a:extLst>
         </p:spPr>
       </p:pic>
     </p:spTree>
@@ -3933,27 +5892,29 @@
         </p:nvSpPr>
         <p:spPr>
           <a:xfrm>
-            <a:off x="838200" y="0"/>
-            <a:ext cx="10515600" cy="905069"/>
+            <a:off x="838200" y="1"/>
+            <a:ext cx="10515600" cy="606490"/>
           </a:xfrm>
         </p:spPr>
         <p:txBody>
-          <a:bodyPr/>
+          <a:bodyPr>
+            <a:normAutofit fontScale="90000"/>
+          </a:bodyPr>
           <a:lstStyle/>
           <a:p>
             <a:r>
               <a:rPr lang="es-CO" dirty="0"/>
-              <a:t>SEROFOI -VPH - COL</a:t>
+              <a:t>SEROFOI -VPH – COL (HPV18)</a:t>
             </a:r>
           </a:p>
         </p:txBody>
       </p:sp>
       <p:pic>
         <p:nvPicPr>
-          <p:cNvPr id="5" name="Imagen 4">
-            <a:extLst>
-              <a:ext uri="{FF2B5EF4-FFF2-40B4-BE49-F238E27FC236}">
-                <a16:creationId xmlns:a16="http://schemas.microsoft.com/office/drawing/2014/main" id="{F7E9DEAA-A7D1-40A9-FCA4-E73EB20F3F82}"/>
+          <p:cNvPr id="6" name="Imagen 5">
+            <a:extLst>
+              <a:ext uri="{FF2B5EF4-FFF2-40B4-BE49-F238E27FC236}">
+                <a16:creationId xmlns:a16="http://schemas.microsoft.com/office/drawing/2014/main" id="{57EE9D5A-EB80-A630-D4E2-E2354907C926}"/>
               </a:ext>
             </a:extLst>
           </p:cNvPr>
@@ -3970,8 +5931,8 @@
         </p:blipFill>
         <p:spPr>
           <a:xfrm>
-            <a:off x="1558212" y="745640"/>
-            <a:ext cx="6792686" cy="5944391"/>
+            <a:off x="1215639" y="876300"/>
+            <a:ext cx="7836671" cy="6858000"/>
           </a:xfrm>
           <a:prstGeom prst="rect">
             <a:avLst/>
@@ -4024,40 +5985,55 @@
             <p:ph type="title"/>
           </p:nvPr>
         </p:nvSpPr>
-        <p:spPr/>
-        <p:txBody>
-          <a:bodyPr/>
+        <p:spPr>
+          <a:xfrm>
+            <a:off x="838200" y="365126"/>
+            <a:ext cx="10515600" cy="315912"/>
+          </a:xfrm>
+        </p:spPr>
+        <p:txBody>
+          <a:bodyPr>
+            <a:normAutofit fontScale="90000"/>
+          </a:bodyPr>
           <a:lstStyle/>
           <a:p>
-            <a:endParaRPr lang="es-CO"/>
-          </a:p>
-        </p:txBody>
-      </p:sp>
-      <p:sp>
-        <p:nvSpPr>
-          <p:cNvPr id="3" name="Marcador de contenido 2">
-            <a:extLst>
-              <a:ext uri="{FF2B5EF4-FFF2-40B4-BE49-F238E27FC236}">
-                <a16:creationId xmlns:a16="http://schemas.microsoft.com/office/drawing/2014/main" id="{8705336F-3030-FF79-5410-92C2C98FDEEE}"/>
-              </a:ext>
-            </a:extLst>
-          </p:cNvPr>
-          <p:cNvSpPr>
-            <a:spLocks noGrp="1"/>
-          </p:cNvSpPr>
-          <p:nvPr>
-            <p:ph idx="1"/>
-          </p:nvPr>
-        </p:nvSpPr>
-        <p:spPr/>
-        <p:txBody>
-          <a:bodyPr/>
-          <a:lstStyle/>
-          <a:p>
-            <a:endParaRPr lang="es-CO"/>
-          </a:p>
-        </p:txBody>
-      </p:sp>
+            <a:r>
+              <a:rPr lang="es-CO" dirty="0"/>
+              <a:t>SEROFOI -VPH – COL (HPV16)</a:t>
+            </a:r>
+          </a:p>
+        </p:txBody>
+      </p:sp>
+      <p:pic>
+        <p:nvPicPr>
+          <p:cNvPr id="8" name="Imagen 7">
+            <a:extLst>
+              <a:ext uri="{FF2B5EF4-FFF2-40B4-BE49-F238E27FC236}">
+                <a16:creationId xmlns:a16="http://schemas.microsoft.com/office/drawing/2014/main" id="{E46B91E9-45A3-E6AE-9873-33FFE574D708}"/>
+              </a:ext>
+            </a:extLst>
+          </p:cNvPr>
+          <p:cNvPicPr>
+            <a:picLocks noChangeAspect="1"/>
+          </p:cNvPicPr>
+          <p:nvPr/>
+        </p:nvPicPr>
+        <p:blipFill>
+          <a:blip r:embed="rId2"/>
+          <a:stretch>
+            <a:fillRect/>
+          </a:stretch>
+        </p:blipFill>
+        <p:spPr>
+          <a:xfrm>
+            <a:off x="838200" y="681038"/>
+            <a:ext cx="7836671" cy="6858000"/>
+          </a:xfrm>
+          <a:prstGeom prst="rect">
+            <a:avLst/>
+          </a:prstGeom>
+        </p:spPr>
+      </p:pic>
     </p:spTree>
     <p:extLst>
       <p:ext uri="{BB962C8B-B14F-4D97-AF65-F5344CB8AC3E}">
@@ -4103,7 +6079,7 @@
           <p:nvPr/>
         </p:nvPicPr>
         <p:blipFill>
-          <a:blip r:embed="rId2"/>
+          <a:blip r:embed="rId3"/>
           <a:stretch>
             <a:fillRect/>
           </a:stretch>
@@ -4164,40 +6140,55 @@
             <p:ph type="title"/>
           </p:nvPr>
         </p:nvSpPr>
-        <p:spPr/>
-        <p:txBody>
-          <a:bodyPr/>
+        <p:spPr>
+          <a:xfrm>
+            <a:off x="838200" y="365125"/>
+            <a:ext cx="10515600" cy="465299"/>
+          </a:xfrm>
+        </p:spPr>
+        <p:txBody>
+          <a:bodyPr>
+            <a:normAutofit fontScale="90000"/>
+          </a:bodyPr>
           <a:lstStyle/>
           <a:p>
-            <a:endParaRPr lang="es-CO"/>
-          </a:p>
-        </p:txBody>
-      </p:sp>
-      <p:sp>
-        <p:nvSpPr>
-          <p:cNvPr id="3" name="Marcador de contenido 2">
-            <a:extLst>
-              <a:ext uri="{FF2B5EF4-FFF2-40B4-BE49-F238E27FC236}">
-                <a16:creationId xmlns:a16="http://schemas.microsoft.com/office/drawing/2014/main" id="{F2973803-41FF-2115-06E3-D9B9833A4BDF}"/>
-              </a:ext>
-            </a:extLst>
-          </p:cNvPr>
-          <p:cNvSpPr>
-            <a:spLocks noGrp="1"/>
-          </p:cNvSpPr>
-          <p:nvPr>
-            <p:ph idx="1"/>
-          </p:nvPr>
-        </p:nvSpPr>
-        <p:spPr/>
-        <p:txBody>
-          <a:bodyPr/>
-          <a:lstStyle/>
-          <a:p>
-            <a:endParaRPr lang="es-CO"/>
-          </a:p>
-        </p:txBody>
-      </p:sp>
+            <a:r>
+              <a:rPr lang="es-CO" dirty="0"/>
+              <a:t>SEROFOI -VPH – COL (HPV16/18)</a:t>
+            </a:r>
+          </a:p>
+        </p:txBody>
+      </p:sp>
+      <p:pic>
+        <p:nvPicPr>
+          <p:cNvPr id="4" name="Imagen 3">
+            <a:extLst>
+              <a:ext uri="{FF2B5EF4-FFF2-40B4-BE49-F238E27FC236}">
+                <a16:creationId xmlns:a16="http://schemas.microsoft.com/office/drawing/2014/main" id="{311546A2-DD7D-2332-F3E0-095B180E615F}"/>
+              </a:ext>
+            </a:extLst>
+          </p:cNvPr>
+          <p:cNvPicPr>
+            <a:picLocks noChangeAspect="1"/>
+          </p:cNvPicPr>
+          <p:nvPr/>
+        </p:nvPicPr>
+        <p:blipFill>
+          <a:blip r:embed="rId2"/>
+          <a:stretch>
+            <a:fillRect/>
+          </a:stretch>
+        </p:blipFill>
+        <p:spPr>
+          <a:xfrm>
+            <a:off x="1171575" y="818246"/>
+            <a:ext cx="7134225" cy="6039754"/>
+          </a:xfrm>
+          <a:prstGeom prst="rect">
+            <a:avLst/>
+          </a:prstGeom>
+        </p:spPr>
+      </p:pic>
     </p:spTree>
     <p:extLst>
       <p:ext uri="{BB962C8B-B14F-4D97-AF65-F5344CB8AC3E}">
@@ -4243,7 +6234,7 @@
           <p:nvPr/>
         </p:nvPicPr>
         <p:blipFill>
-          <a:blip r:embed="rId2"/>
+          <a:blip r:embed="rId3"/>
           <a:stretch>
             <a:fillRect/>
           </a:stretch>
@@ -4303,7 +6294,7 @@
           <p:nvPr/>
         </p:nvPicPr>
         <p:blipFill>
-          <a:blip r:embed="rId2"/>
+          <a:blip r:embed="rId3"/>
           <a:stretch>
             <a:fillRect/>
           </a:stretch>
@@ -4363,7 +6354,7 @@
           <p:nvPr/>
         </p:nvPicPr>
         <p:blipFill>
-          <a:blip r:embed="rId2"/>
+          <a:blip r:embed="rId3"/>
           <a:stretch>
             <a:fillRect/>
           </a:stretch>
@@ -4423,7 +6414,7 @@
           <p:nvPr/>
         </p:nvPicPr>
         <p:blipFill>
-          <a:blip r:embed="rId2"/>
+          <a:blip r:embed="rId3"/>
           <a:stretch>
             <a:fillRect/>
           </a:stretch>
@@ -4543,7 +6534,7 @@
           <p:nvPr/>
         </p:nvPicPr>
         <p:blipFill>
-          <a:blip r:embed="rId2"/>
+          <a:blip r:embed="rId3"/>
           <a:stretch>
             <a:fillRect/>
           </a:stretch>
@@ -4944,4 +6935,319 @@
     </a:ext>
   </a:extLst>
 </a:theme>
+</file>
+
+<file path=ppt/theme/theme2.xml><?xml version="1.0" encoding="utf-8"?>
+<a:theme xmlns:a="http://schemas.openxmlformats.org/drawingml/2006/main" name="Tema de Office">
+  <a:themeElements>
+    <a:clrScheme name="Office">
+      <a:dk1>
+        <a:sysClr val="windowText" lastClr="000000"/>
+      </a:dk1>
+      <a:lt1>
+        <a:sysClr val="window" lastClr="FFFFFF"/>
+      </a:lt1>
+      <a:dk2>
+        <a:srgbClr val="0E2841"/>
+      </a:dk2>
+      <a:lt2>
+        <a:srgbClr val="E8E8E8"/>
+      </a:lt2>
+      <a:accent1>
+        <a:srgbClr val="156082"/>
+      </a:accent1>
+      <a:accent2>
+        <a:srgbClr val="E97132"/>
+      </a:accent2>
+      <a:accent3>
+        <a:srgbClr val="196B24"/>
+      </a:accent3>
+      <a:accent4>
+        <a:srgbClr val="0F9ED5"/>
+      </a:accent4>
+      <a:accent5>
+        <a:srgbClr val="A02B93"/>
+      </a:accent5>
+      <a:accent6>
+        <a:srgbClr val="4EA72E"/>
+      </a:accent6>
+      <a:hlink>
+        <a:srgbClr val="467886"/>
+      </a:hlink>
+      <a:folHlink>
+        <a:srgbClr val="96607D"/>
+      </a:folHlink>
+    </a:clrScheme>
+    <a:fontScheme name="Office">
+      <a:majorFont>
+        <a:latin typeface="Aptos Display" panose="02110004020202020204"/>
+        <a:ea typeface=""/>
+        <a:cs typeface=""/>
+        <a:font script="Jpan" typeface="游ゴシック Light"/>
+        <a:font script="Hang" typeface="맑은 고딕"/>
+        <a:font script="Hans" typeface="等线 Light"/>
+        <a:font script="Hant" typeface="新細明體"/>
+        <a:font script="Arab" typeface="Times New Roman"/>
+        <a:font script="Hebr" typeface="Times New Roman"/>
+        <a:font script="Thai" typeface="Angsana New"/>
+        <a:font script="Ethi" typeface="Nyala"/>
+        <a:font script="Beng" typeface="Vrinda"/>
+        <a:font script="Gujr" typeface="Shruti"/>
+        <a:font script="Khmr" typeface="MoolBoran"/>
+        <a:font script="Knda" typeface="Tunga"/>
+        <a:font script="Guru" typeface="Raavi"/>
+        <a:font script="Cans" typeface="Euphemia"/>
+        <a:font script="Cher" typeface="Plantagenet Cherokee"/>
+        <a:font script="Yiii" typeface="Microsoft Yi Baiti"/>
+        <a:font script="Tibt" typeface="Microsoft Himalaya"/>
+        <a:font script="Thaa" typeface="MV Boli"/>
+        <a:font script="Deva" typeface="Mangal"/>
+        <a:font script="Telu" typeface="Gautami"/>
+        <a:font script="Taml" typeface="Latha"/>
+        <a:font script="Syrc" typeface="Estrangelo Edessa"/>
+        <a:font script="Orya" typeface="Kalinga"/>
+        <a:font script="Mlym" typeface="Kartika"/>
+        <a:font script="Laoo" typeface="DokChampa"/>
+        <a:font script="Sinh" typeface="Iskoola Pota"/>
+        <a:font script="Mong" typeface="Mongolian Baiti"/>
+        <a:font script="Viet" typeface="Times New Roman"/>
+        <a:font script="Uigh" typeface="Microsoft Uighur"/>
+        <a:font script="Geor" typeface="Sylfaen"/>
+        <a:font script="Armn" typeface="Arial"/>
+        <a:font script="Bugi" typeface="Leelawadee UI"/>
+        <a:font script="Bopo" typeface="Microsoft JhengHei"/>
+        <a:font script="Java" typeface="Javanese Text"/>
+        <a:font script="Lisu" typeface="Segoe UI"/>
+        <a:font script="Mymr" typeface="Myanmar Text"/>
+        <a:font script="Nkoo" typeface="Ebrima"/>
+        <a:font script="Olck" typeface="Nirmala UI"/>
+        <a:font script="Osma" typeface="Ebrima"/>
+        <a:font script="Phag" typeface="Phagspa"/>
+        <a:font script="Syrn" typeface="Estrangelo Edessa"/>
+        <a:font script="Syrj" typeface="Estrangelo Edessa"/>
+        <a:font script="Syre" typeface="Estrangelo Edessa"/>
+        <a:font script="Sora" typeface="Nirmala UI"/>
+        <a:font script="Tale" typeface="Microsoft Tai Le"/>
+        <a:font script="Talu" typeface="Microsoft New Tai Lue"/>
+        <a:font script="Tfng" typeface="Ebrima"/>
+      </a:majorFont>
+      <a:minorFont>
+        <a:latin typeface="Aptos" panose="02110004020202020204"/>
+        <a:ea typeface=""/>
+        <a:cs typeface=""/>
+        <a:font script="Jpan" typeface="游ゴシック"/>
+        <a:font script="Hang" typeface="맑은 고딕"/>
+        <a:font script="Hans" typeface="等线"/>
+        <a:font script="Hant" typeface="新細明體"/>
+        <a:font script="Arab" typeface="Arial"/>
+        <a:font script="Hebr" typeface="Arial"/>
+        <a:font script="Thai" typeface="Cordia New"/>
+        <a:font script="Ethi" typeface="Nyala"/>
+        <a:font script="Beng" typeface="Vrinda"/>
+        <a:font script="Gujr" typeface="Shruti"/>
+        <a:font script="Khmr" typeface="DaunPenh"/>
+        <a:font script="Knda" typeface="Tunga"/>
+        <a:font script="Guru" typeface="Raavi"/>
+        <a:font script="Cans" typeface="Euphemia"/>
+        <a:font script="Cher" typeface="Plantagenet Cherokee"/>
+        <a:font script="Yiii" typeface="Microsoft Yi Baiti"/>
+        <a:font script="Tibt" typeface="Microsoft Himalaya"/>
+        <a:font script="Thaa" typeface="MV Boli"/>
+        <a:font script="Deva" typeface="Mangal"/>
+        <a:font script="Telu" typeface="Gautami"/>
+        <a:font script="Taml" typeface="Latha"/>
+        <a:font script="Syrc" typeface="Estrangelo Edessa"/>
+        <a:font script="Orya" typeface="Kalinga"/>
+        <a:font script="Mlym" typeface="Kartika"/>
+        <a:font script="Laoo" typeface="DokChampa"/>
+        <a:font script="Sinh" typeface="Iskoola Pota"/>
+        <a:font script="Mong" typeface="Mongolian Baiti"/>
+        <a:font script="Viet" typeface="Arial"/>
+        <a:font script="Uigh" typeface="Microsoft Uighur"/>
+        <a:font script="Geor" typeface="Sylfaen"/>
+        <a:font script="Armn" typeface="Arial"/>
+        <a:font script="Bugi" typeface="Leelawadee UI"/>
+        <a:font script="Bopo" typeface="Microsoft JhengHei"/>
+        <a:font script="Java" typeface="Javanese Text"/>
+        <a:font script="Lisu" typeface="Segoe UI"/>
+        <a:font script="Mymr" typeface="Myanmar Text"/>
+        <a:font script="Nkoo" typeface="Ebrima"/>
+        <a:font script="Olck" typeface="Nirmala UI"/>
+        <a:font script="Osma" typeface="Ebrima"/>
+        <a:font script="Phag" typeface="Phagspa"/>
+        <a:font script="Syrn" typeface="Estrangelo Edessa"/>
+        <a:font script="Syrj" typeface="Estrangelo Edessa"/>
+        <a:font script="Syre" typeface="Estrangelo Edessa"/>
+        <a:font script="Sora" typeface="Nirmala UI"/>
+        <a:font script="Tale" typeface="Microsoft Tai Le"/>
+        <a:font script="Talu" typeface="Microsoft New Tai Lue"/>
+        <a:font script="Tfng" typeface="Ebrima"/>
+      </a:minorFont>
+    </a:fontScheme>
+    <a:fmtScheme name="Office">
+      <a:fillStyleLst>
+        <a:solidFill>
+          <a:schemeClr val="phClr"/>
+        </a:solidFill>
+        <a:gradFill rotWithShape="1">
+          <a:gsLst>
+            <a:gs pos="0">
+              <a:schemeClr val="phClr">
+                <a:lumMod val="110000"/>
+                <a:satMod val="105000"/>
+                <a:tint val="67000"/>
+              </a:schemeClr>
+            </a:gs>
+            <a:gs pos="50000">
+              <a:schemeClr val="phClr">
+                <a:lumMod val="105000"/>
+                <a:satMod val="103000"/>
+                <a:tint val="73000"/>
+              </a:schemeClr>
+            </a:gs>
+            <a:gs pos="100000">
+              <a:schemeClr val="phClr">
+                <a:lumMod val="105000"/>
+                <a:satMod val="109000"/>
+                <a:tint val="81000"/>
+              </a:schemeClr>
+            </a:gs>
+          </a:gsLst>
+          <a:lin ang="5400000" scaled="0"/>
+        </a:gradFill>
+        <a:gradFill rotWithShape="1">
+          <a:gsLst>
+            <a:gs pos="0">
+              <a:schemeClr val="phClr">
+                <a:satMod val="103000"/>
+                <a:lumMod val="102000"/>
+                <a:tint val="94000"/>
+              </a:schemeClr>
+            </a:gs>
+            <a:gs pos="50000">
+              <a:schemeClr val="phClr">
+                <a:satMod val="110000"/>
+                <a:lumMod val="100000"/>
+                <a:shade val="100000"/>
+              </a:schemeClr>
+            </a:gs>
+            <a:gs pos="100000">
+              <a:schemeClr val="phClr">
+                <a:lumMod val="99000"/>
+                <a:satMod val="120000"/>
+                <a:shade val="78000"/>
+              </a:schemeClr>
+            </a:gs>
+          </a:gsLst>
+          <a:lin ang="5400000" scaled="0"/>
+        </a:gradFill>
+      </a:fillStyleLst>
+      <a:lnStyleLst>
+        <a:ln w="12700" cap="flat" cmpd="sng" algn="ctr">
+          <a:solidFill>
+            <a:schemeClr val="phClr"/>
+          </a:solidFill>
+          <a:prstDash val="solid"/>
+          <a:miter lim="800000"/>
+        </a:ln>
+        <a:ln w="19050" cap="flat" cmpd="sng" algn="ctr">
+          <a:solidFill>
+            <a:schemeClr val="phClr"/>
+          </a:solidFill>
+          <a:prstDash val="solid"/>
+          <a:miter lim="800000"/>
+        </a:ln>
+        <a:ln w="25400" cap="flat" cmpd="sng" algn="ctr">
+          <a:solidFill>
+            <a:schemeClr val="phClr"/>
+          </a:solidFill>
+          <a:prstDash val="solid"/>
+          <a:miter lim="800000"/>
+        </a:ln>
+      </a:lnStyleLst>
+      <a:effectStyleLst>
+        <a:effectStyle>
+          <a:effectLst/>
+        </a:effectStyle>
+        <a:effectStyle>
+          <a:effectLst/>
+        </a:effectStyle>
+        <a:effectStyle>
+          <a:effectLst>
+            <a:outerShdw blurRad="57150" dist="19050" dir="5400000" algn="ctr" rotWithShape="0">
+              <a:srgbClr val="000000">
+                <a:alpha val="63000"/>
+              </a:srgbClr>
+            </a:outerShdw>
+          </a:effectLst>
+        </a:effectStyle>
+      </a:effectStyleLst>
+      <a:bgFillStyleLst>
+        <a:solidFill>
+          <a:schemeClr val="phClr"/>
+        </a:solidFill>
+        <a:solidFill>
+          <a:schemeClr val="phClr">
+            <a:tint val="95000"/>
+            <a:satMod val="170000"/>
+          </a:schemeClr>
+        </a:solidFill>
+        <a:gradFill rotWithShape="1">
+          <a:gsLst>
+            <a:gs pos="0">
+              <a:schemeClr val="phClr">
+                <a:tint val="93000"/>
+                <a:satMod val="150000"/>
+                <a:shade val="98000"/>
+                <a:lumMod val="102000"/>
+              </a:schemeClr>
+            </a:gs>
+            <a:gs pos="50000">
+              <a:schemeClr val="phClr">
+                <a:tint val="98000"/>
+                <a:satMod val="130000"/>
+                <a:shade val="90000"/>
+                <a:lumMod val="103000"/>
+              </a:schemeClr>
+            </a:gs>
+            <a:gs pos="100000">
+              <a:schemeClr val="phClr">
+                <a:shade val="63000"/>
+                <a:satMod val="120000"/>
+              </a:schemeClr>
+            </a:gs>
+          </a:gsLst>
+          <a:lin ang="5400000" scaled="0"/>
+        </a:gradFill>
+      </a:bgFillStyleLst>
+    </a:fmtScheme>
+  </a:themeElements>
+  <a:objectDefaults>
+    <a:lnDef>
+      <a:spPr/>
+      <a:bodyPr/>
+      <a:lstStyle/>
+      <a:style>
+        <a:lnRef idx="2">
+          <a:schemeClr val="accent1"/>
+        </a:lnRef>
+        <a:fillRef idx="0">
+          <a:schemeClr val="accent1"/>
+        </a:fillRef>
+        <a:effectRef idx="1">
+          <a:schemeClr val="accent1"/>
+        </a:effectRef>
+        <a:fontRef idx="minor">
+          <a:schemeClr val="tx1"/>
+        </a:fontRef>
+      </a:style>
+    </a:lnDef>
+  </a:objectDefaults>
+  <a:extraClrSchemeLst/>
+  <a:extLst>
+    <a:ext uri="{05A4C25C-085E-4340-85A3-A5531E510DB2}">
+      <thm15:themeFamily xmlns:thm15="http://schemas.microsoft.com/office/thememl/2012/main" name="Office Theme" id="{2E142A2C-CD16-42D6-873A-C26D2A0506FA}" vid="{1BDDFF52-6CD6-40A5-AB3C-68EB2F1E4D0A}"/>
+    </a:ext>
+  </a:extLst>
+</a:theme>
 </file>
</xml_diff>

<commit_message>
correcion de escala de graficas y paneles
</commit_message>
<xml_diff>
--- a/Graficas/HPV 16  -18 Por país –Alta.pptx
+++ b/Graficas/HPV 16  -18 Por país –Alta.pptx
@@ -5,7 +5,7 @@
     <p:sldMasterId id="2147483648" r:id="rId1"/>
   </p:sldMasterIdLst>
   <p:notesMasterIdLst>
-    <p:notesMasterId r:id="rId22"/>
+    <p:notesMasterId r:id="rId23"/>
   </p:notesMasterIdLst>
   <p:sldIdLst>
     <p:sldId id="275" r:id="rId2"/>
@@ -20,14 +20,15 @@
     <p:sldId id="282" r:id="rId11"/>
     <p:sldId id="283" r:id="rId12"/>
     <p:sldId id="284" r:id="rId13"/>
-    <p:sldId id="285" r:id="rId14"/>
-    <p:sldId id="286" r:id="rId15"/>
-    <p:sldId id="287" r:id="rId16"/>
-    <p:sldId id="288" r:id="rId17"/>
-    <p:sldId id="289" r:id="rId18"/>
-    <p:sldId id="290" r:id="rId19"/>
-    <p:sldId id="291" r:id="rId20"/>
-    <p:sldId id="292" r:id="rId21"/>
+    <p:sldId id="286" r:id="rId14"/>
+    <p:sldId id="287" r:id="rId15"/>
+    <p:sldId id="293" r:id="rId16"/>
+    <p:sldId id="294" r:id="rId17"/>
+    <p:sldId id="288" r:id="rId18"/>
+    <p:sldId id="289" r:id="rId19"/>
+    <p:sldId id="290" r:id="rId20"/>
+    <p:sldId id="291" r:id="rId21"/>
+    <p:sldId id="292" r:id="rId22"/>
   </p:sldIdLst>
   <p:sldSz cx="12192000" cy="6858000"/>
   <p:notesSz cx="6858000" cy="9144000"/>
@@ -137,7 +138,7 @@
 <file path=ppt/revisionInfo.xml><?xml version="1.0" encoding="utf-8"?>
 <p1510:revInfo xmlns:a="http://schemas.openxmlformats.org/drawingml/2006/main" xmlns:r="http://schemas.openxmlformats.org/officeDocument/2006/relationships" xmlns:p1510="http://schemas.microsoft.com/office/powerpoint/2015/10/main">
   <p1510:revLst>
-    <p1510:client id="{480980D8-EB31-4630-8616-892D1CF22178}" v="9" dt="2024-01-23T00:08:20.698"/>
+    <p1510:client id="{480980D8-EB31-4630-8616-892D1CF22178}" v="31" dt="2024-02-01T03:49:33.650"/>
   </p1510:revLst>
 </p1510:revInfo>
 </file>
@@ -146,13 +147,13 @@
 <pc:chgInfo xmlns:a="http://schemas.openxmlformats.org/drawingml/2006/main" xmlns:r="http://schemas.openxmlformats.org/officeDocument/2006/relationships" xmlns:ac="http://schemas.microsoft.com/office/drawing/2013/main/command" xmlns:pc="http://schemas.microsoft.com/office/powerpoint/2013/main/command">
   <pc:docChgLst>
     <pc:chgData name="JENNY CAROLINA DUSSÁN NIÑO" userId="eaf10c2cd7d88393" providerId="LiveId" clId="{480980D8-EB31-4630-8616-892D1CF22178}"/>
-    <pc:docChg chg="undo custSel modSld">
-      <pc:chgData name="JENNY CAROLINA DUSSÁN NIÑO" userId="eaf10c2cd7d88393" providerId="LiveId" clId="{480980D8-EB31-4630-8616-892D1CF22178}" dt="2024-01-23T02:00:48.339" v="833" actId="20577"/>
+    <pc:docChg chg="undo custSel addSld delSld modSld">
+      <pc:chgData name="JENNY CAROLINA DUSSÁN NIÑO" userId="eaf10c2cd7d88393" providerId="LiveId" clId="{480980D8-EB31-4630-8616-892D1CF22178}" dt="2024-02-01T03:49:33.650" v="1316"/>
       <pc:docMkLst>
         <pc:docMk/>
       </pc:docMkLst>
       <pc:sldChg chg="modNotesTx">
-        <pc:chgData name="JENNY CAROLINA DUSSÁN NIÑO" userId="eaf10c2cd7d88393" providerId="LiveId" clId="{480980D8-EB31-4630-8616-892D1CF22178}" dt="2024-01-23T01:48:12.759" v="383" actId="20577"/>
+        <pc:chgData name="JENNY CAROLINA DUSSÁN NIÑO" userId="eaf10c2cd7d88393" providerId="LiveId" clId="{480980D8-EB31-4630-8616-892D1CF22178}" dt="2024-02-01T02:46:04.557" v="1167" actId="20577"/>
         <pc:sldMkLst>
           <pc:docMk/>
           <pc:sldMk cId="346576912" sldId="273"/>
@@ -166,39 +167,272 @@
         </pc:sldMkLst>
       </pc:sldChg>
       <pc:sldChg chg="modNotesTx">
-        <pc:chgData name="JENNY CAROLINA DUSSÁN NIÑO" userId="eaf10c2cd7d88393" providerId="LiveId" clId="{480980D8-EB31-4630-8616-892D1CF22178}" dt="2024-01-23T01:50:21.414" v="629" actId="20577"/>
+        <pc:chgData name="JENNY CAROLINA DUSSÁN NIÑO" userId="eaf10c2cd7d88393" providerId="LiveId" clId="{480980D8-EB31-4630-8616-892D1CF22178}" dt="2024-02-01T02:46:43.085" v="1232" actId="20577"/>
         <pc:sldMkLst>
           <pc:docMk/>
           <pc:sldMk cId="149053188" sldId="276"/>
         </pc:sldMkLst>
       </pc:sldChg>
-      <pc:sldChg chg="modNotesTx">
-        <pc:chgData name="JENNY CAROLINA DUSSÁN NIÑO" userId="eaf10c2cd7d88393" providerId="LiveId" clId="{480980D8-EB31-4630-8616-892D1CF22178}" dt="2024-01-23T01:56:24.954" v="696" actId="20577"/>
+      <pc:sldChg chg="addSp modSp mod modNotesTx">
+        <pc:chgData name="JENNY CAROLINA DUSSÁN NIÑO" userId="eaf10c2cd7d88393" providerId="LiveId" clId="{480980D8-EB31-4630-8616-892D1CF22178}" dt="2024-02-01T02:45:33.041" v="1109" actId="1076"/>
         <pc:sldMkLst>
           <pc:docMk/>
           <pc:sldMk cId="3659681651" sldId="277"/>
         </pc:sldMkLst>
+        <pc:picChg chg="add mod">
+          <ac:chgData name="JENNY CAROLINA DUSSÁN NIÑO" userId="eaf10c2cd7d88393" providerId="LiveId" clId="{480980D8-EB31-4630-8616-892D1CF22178}" dt="2024-02-01T02:45:33.041" v="1109" actId="1076"/>
+          <ac:picMkLst>
+            <pc:docMk/>
+            <pc:sldMk cId="3659681651" sldId="277"/>
+            <ac:picMk id="2" creationId="{69C565E8-506A-ED8D-49EE-518703EB6847}"/>
+          </ac:picMkLst>
+        </pc:picChg>
+        <pc:picChg chg="mod">
+          <ac:chgData name="JENNY CAROLINA DUSSÁN NIÑO" userId="eaf10c2cd7d88393" providerId="LiveId" clId="{480980D8-EB31-4630-8616-892D1CF22178}" dt="2024-02-01T02:45:17.465" v="1102" actId="1076"/>
+          <ac:picMkLst>
+            <pc:docMk/>
+            <pc:sldMk cId="3659681651" sldId="277"/>
+            <ac:picMk id="5" creationId="{EBF38BC2-93E0-4149-D233-46103C2C3BB0}"/>
+          </ac:picMkLst>
+        </pc:picChg>
       </pc:sldChg>
-      <pc:sldChg chg="modNotesTx">
-        <pc:chgData name="JENNY CAROLINA DUSSÁN NIÑO" userId="eaf10c2cd7d88393" providerId="LiveId" clId="{480980D8-EB31-4630-8616-892D1CF22178}" dt="2024-01-23T01:58:59.646" v="747" actId="20577"/>
+      <pc:sldChg chg="addSp modSp mod modNotesTx">
+        <pc:chgData name="JENNY CAROLINA DUSSÁN NIÑO" userId="eaf10c2cd7d88393" providerId="LiveId" clId="{480980D8-EB31-4630-8616-892D1CF22178}" dt="2024-02-01T02:48:16.700" v="1237" actId="1076"/>
         <pc:sldMkLst>
           <pc:docMk/>
           <pc:sldMk cId="2601453406" sldId="278"/>
         </pc:sldMkLst>
+        <pc:picChg chg="add mod">
+          <ac:chgData name="JENNY CAROLINA DUSSÁN NIÑO" userId="eaf10c2cd7d88393" providerId="LiveId" clId="{480980D8-EB31-4630-8616-892D1CF22178}" dt="2024-02-01T02:48:16.700" v="1237" actId="1076"/>
+          <ac:picMkLst>
+            <pc:docMk/>
+            <pc:sldMk cId="2601453406" sldId="278"/>
+            <ac:picMk id="2" creationId="{B5FB21C5-9006-5CBC-506B-5A8642767092}"/>
+          </ac:picMkLst>
+        </pc:picChg>
+        <pc:picChg chg="mod">
+          <ac:chgData name="JENNY CAROLINA DUSSÁN NIÑO" userId="eaf10c2cd7d88393" providerId="LiveId" clId="{480980D8-EB31-4630-8616-892D1CF22178}" dt="2024-02-01T02:47:14.296" v="1233" actId="1076"/>
+          <ac:picMkLst>
+            <pc:docMk/>
+            <pc:sldMk cId="2601453406" sldId="278"/>
+            <ac:picMk id="6" creationId="{CC57D066-1E33-9C02-F909-EB7FB0395687}"/>
+          </ac:picMkLst>
+        </pc:picChg>
       </pc:sldChg>
-      <pc:sldChg chg="modNotesTx">
-        <pc:chgData name="JENNY CAROLINA DUSSÁN NIÑO" userId="eaf10c2cd7d88393" providerId="LiveId" clId="{480980D8-EB31-4630-8616-892D1CF22178}" dt="2024-01-23T01:59:38.833" v="801" actId="20577"/>
+      <pc:sldChg chg="addSp modSp mod">
+        <pc:chgData name="JENNY CAROLINA DUSSÁN NIÑO" userId="eaf10c2cd7d88393" providerId="LiveId" clId="{480980D8-EB31-4630-8616-892D1CF22178}" dt="2024-02-01T03:05:46.177" v="1244" actId="14100"/>
+        <pc:sldMkLst>
+          <pc:docMk/>
+          <pc:sldMk cId="3587460602" sldId="279"/>
+        </pc:sldMkLst>
+        <pc:picChg chg="add mod">
+          <ac:chgData name="JENNY CAROLINA DUSSÁN NIÑO" userId="eaf10c2cd7d88393" providerId="LiveId" clId="{480980D8-EB31-4630-8616-892D1CF22178}" dt="2024-02-01T03:05:46.177" v="1244" actId="14100"/>
+          <ac:picMkLst>
+            <pc:docMk/>
+            <pc:sldMk cId="3587460602" sldId="279"/>
+            <ac:picMk id="2" creationId="{C1E5E247-B1DE-468F-FB67-4A2FEB63170B}"/>
+          </ac:picMkLst>
+        </pc:picChg>
+        <pc:picChg chg="mod">
+          <ac:chgData name="JENNY CAROLINA DUSSÁN NIÑO" userId="eaf10c2cd7d88393" providerId="LiveId" clId="{480980D8-EB31-4630-8616-892D1CF22178}" dt="2024-02-01T03:05:41.837" v="1243" actId="14100"/>
+          <ac:picMkLst>
+            <pc:docMk/>
+            <pc:sldMk cId="3587460602" sldId="279"/>
+            <ac:picMk id="5" creationId="{E49EE1F5-C666-1A75-62E8-E08C81B8FD09}"/>
+          </ac:picMkLst>
+        </pc:picChg>
+      </pc:sldChg>
+      <pc:sldChg chg="addSp modSp mod modNotesTx">
+        <pc:chgData name="JENNY CAROLINA DUSSÁN NIÑO" userId="eaf10c2cd7d88393" providerId="LiveId" clId="{480980D8-EB31-4630-8616-892D1CF22178}" dt="2024-02-01T03:20:41.109" v="1256" actId="14100"/>
         <pc:sldMkLst>
           <pc:docMk/>
           <pc:sldMk cId="1037340267" sldId="280"/>
         </pc:sldMkLst>
+        <pc:picChg chg="add mod">
+          <ac:chgData name="JENNY CAROLINA DUSSÁN NIÑO" userId="eaf10c2cd7d88393" providerId="LiveId" clId="{480980D8-EB31-4630-8616-892D1CF22178}" dt="2024-02-01T03:20:41.109" v="1256" actId="14100"/>
+          <ac:picMkLst>
+            <pc:docMk/>
+            <pc:sldMk cId="1037340267" sldId="280"/>
+            <ac:picMk id="2" creationId="{475915E5-9E15-BFBA-9E93-F9D7D42AEC00}"/>
+          </ac:picMkLst>
+        </pc:picChg>
+        <pc:picChg chg="mod">
+          <ac:chgData name="JENNY CAROLINA DUSSÁN NIÑO" userId="eaf10c2cd7d88393" providerId="LiveId" clId="{480980D8-EB31-4630-8616-892D1CF22178}" dt="2024-02-01T03:20:28.467" v="1252" actId="14100"/>
+          <ac:picMkLst>
+            <pc:docMk/>
+            <pc:sldMk cId="1037340267" sldId="280"/>
+            <ac:picMk id="5" creationId="{DA2837AB-EDBA-C7E9-59BB-B4F86D81E8C7}"/>
+          </ac:picMkLst>
+        </pc:picChg>
       </pc:sldChg>
-      <pc:sldChg chg="modNotesTx">
-        <pc:chgData name="JENNY CAROLINA DUSSÁN NIÑO" userId="eaf10c2cd7d88393" providerId="LiveId" clId="{480980D8-EB31-4630-8616-892D1CF22178}" dt="2024-01-23T02:00:48.339" v="833" actId="20577"/>
+      <pc:sldChg chg="addSp modSp mod">
+        <pc:chgData name="JENNY CAROLINA DUSSÁN NIÑO" userId="eaf10c2cd7d88393" providerId="LiveId" clId="{480980D8-EB31-4630-8616-892D1CF22178}" dt="2024-02-01T03:32:03.104" v="1305" actId="14100"/>
+        <pc:sldMkLst>
+          <pc:docMk/>
+          <pc:sldMk cId="1369016587" sldId="281"/>
+        </pc:sldMkLst>
+        <pc:picChg chg="add mod">
+          <ac:chgData name="JENNY CAROLINA DUSSÁN NIÑO" userId="eaf10c2cd7d88393" providerId="LiveId" clId="{480980D8-EB31-4630-8616-892D1CF22178}" dt="2024-02-01T03:32:03.104" v="1305" actId="14100"/>
+          <ac:picMkLst>
+            <pc:docMk/>
+            <pc:sldMk cId="1369016587" sldId="281"/>
+            <ac:picMk id="2" creationId="{69B4214C-2C4B-235D-5B06-34212EE46555}"/>
+          </ac:picMkLst>
+        </pc:picChg>
+        <pc:picChg chg="mod">
+          <ac:chgData name="JENNY CAROLINA DUSSÁN NIÑO" userId="eaf10c2cd7d88393" providerId="LiveId" clId="{480980D8-EB31-4630-8616-892D1CF22178}" dt="2024-02-01T03:30:46.436" v="1300" actId="1076"/>
+          <ac:picMkLst>
+            <pc:docMk/>
+            <pc:sldMk cId="1369016587" sldId="281"/>
+            <ac:picMk id="5" creationId="{08878AB9-2B33-4A6B-3F85-B9315758913B}"/>
+          </ac:picMkLst>
+        </pc:picChg>
+      </pc:sldChg>
+      <pc:sldChg chg="addSp modSp mod">
+        <pc:chgData name="JENNY CAROLINA DUSSÁN NIÑO" userId="eaf10c2cd7d88393" providerId="LiveId" clId="{480980D8-EB31-4630-8616-892D1CF22178}" dt="2024-02-01T03:21:57.151" v="1263" actId="14100"/>
+        <pc:sldMkLst>
+          <pc:docMk/>
+          <pc:sldMk cId="1759317795" sldId="282"/>
+        </pc:sldMkLst>
+        <pc:spChg chg="add">
+          <ac:chgData name="JENNY CAROLINA DUSSÁN NIÑO" userId="eaf10c2cd7d88393" providerId="LiveId" clId="{480980D8-EB31-4630-8616-892D1CF22178}" dt="2024-02-01T03:21:46.917" v="1259"/>
+          <ac:spMkLst>
+            <pc:docMk/>
+            <pc:sldMk cId="1759317795" sldId="282"/>
+            <ac:spMk id="2" creationId="{32B928DB-5B3D-B479-442C-38681F554A57}"/>
+          </ac:spMkLst>
+        </pc:spChg>
+        <pc:picChg chg="add mod">
+          <ac:chgData name="JENNY CAROLINA DUSSÁN NIÑO" userId="eaf10c2cd7d88393" providerId="LiveId" clId="{480980D8-EB31-4630-8616-892D1CF22178}" dt="2024-02-01T03:21:57.151" v="1263" actId="14100"/>
+          <ac:picMkLst>
+            <pc:docMk/>
+            <pc:sldMk cId="1759317795" sldId="282"/>
+            <ac:picMk id="3" creationId="{CD37695B-DE35-B1B1-B507-5553FAF5252D}"/>
+          </ac:picMkLst>
+        </pc:picChg>
+        <pc:picChg chg="mod">
+          <ac:chgData name="JENNY CAROLINA DUSSÁN NIÑO" userId="eaf10c2cd7d88393" providerId="LiveId" clId="{480980D8-EB31-4630-8616-892D1CF22178}" dt="2024-02-01T03:21:45.169" v="1258" actId="14100"/>
+          <ac:picMkLst>
+            <pc:docMk/>
+            <pc:sldMk cId="1759317795" sldId="282"/>
+            <ac:picMk id="4" creationId="{357CE874-A7F0-EFE2-12E1-52347F4A31BA}"/>
+          </ac:picMkLst>
+        </pc:picChg>
+      </pc:sldChg>
+      <pc:sldChg chg="addSp modSp mod">
+        <pc:chgData name="JENNY CAROLINA DUSSÁN NIÑO" userId="eaf10c2cd7d88393" providerId="LiveId" clId="{480980D8-EB31-4630-8616-892D1CF22178}" dt="2024-02-01T03:28:33.984" v="1292" actId="1076"/>
+        <pc:sldMkLst>
+          <pc:docMk/>
+          <pc:sldMk cId="1051858763" sldId="283"/>
+        </pc:sldMkLst>
+        <pc:spChg chg="add">
+          <ac:chgData name="JENNY CAROLINA DUSSÁN NIÑO" userId="eaf10c2cd7d88393" providerId="LiveId" clId="{480980D8-EB31-4630-8616-892D1CF22178}" dt="2024-02-01T03:28:17.517" v="1286"/>
+          <ac:spMkLst>
+            <pc:docMk/>
+            <pc:sldMk cId="1051858763" sldId="283"/>
+            <ac:spMk id="2" creationId="{3D9BA797-E196-F8E7-90D1-7C8FE2CD198D}"/>
+          </ac:spMkLst>
+        </pc:spChg>
+        <pc:picChg chg="add mod">
+          <ac:chgData name="JENNY CAROLINA DUSSÁN NIÑO" userId="eaf10c2cd7d88393" providerId="LiveId" clId="{480980D8-EB31-4630-8616-892D1CF22178}" dt="2024-02-01T03:28:33.984" v="1292" actId="1076"/>
+          <ac:picMkLst>
+            <pc:docMk/>
+            <pc:sldMk cId="1051858763" sldId="283"/>
+            <ac:picMk id="3" creationId="{ECDDC326-97BB-37DE-7C44-0530D4172C51}"/>
+          </ac:picMkLst>
+        </pc:picChg>
+        <pc:picChg chg="mod">
+          <ac:chgData name="JENNY CAROLINA DUSSÁN NIÑO" userId="eaf10c2cd7d88393" providerId="LiveId" clId="{480980D8-EB31-4630-8616-892D1CF22178}" dt="2024-02-01T03:28:24.931" v="1288" actId="1076"/>
+          <ac:picMkLst>
+            <pc:docMk/>
+            <pc:sldMk cId="1051858763" sldId="283"/>
+            <ac:picMk id="4" creationId="{C0959891-65F6-D5B2-E9BC-1BD2ECD5DC61}"/>
+          </ac:picMkLst>
+        </pc:picChg>
+      </pc:sldChg>
+      <pc:sldChg chg="addSp modSp mod modNotesTx">
+        <pc:chgData name="JENNY CAROLINA DUSSÁN NIÑO" userId="eaf10c2cd7d88393" providerId="LiveId" clId="{480980D8-EB31-4630-8616-892D1CF22178}" dt="2024-02-01T03:30:13.499" v="1296" actId="14100"/>
         <pc:sldMkLst>
           <pc:docMk/>
           <pc:sldMk cId="721354222" sldId="284"/>
         </pc:sldMkLst>
+        <pc:picChg chg="add mod">
+          <ac:chgData name="JENNY CAROLINA DUSSÁN NIÑO" userId="eaf10c2cd7d88393" providerId="LiveId" clId="{480980D8-EB31-4630-8616-892D1CF22178}" dt="2024-02-01T03:30:13.499" v="1296" actId="14100"/>
+          <ac:picMkLst>
+            <pc:docMk/>
+            <pc:sldMk cId="721354222" sldId="284"/>
+            <ac:picMk id="2" creationId="{FC433412-23A6-9F34-1086-B54E43DEA265}"/>
+          </ac:picMkLst>
+        </pc:picChg>
+        <pc:picChg chg="mod">
+          <ac:chgData name="JENNY CAROLINA DUSSÁN NIÑO" userId="eaf10c2cd7d88393" providerId="LiveId" clId="{480980D8-EB31-4630-8616-892D1CF22178}" dt="2024-02-01T03:26:50.104" v="1283" actId="14100"/>
+          <ac:picMkLst>
+            <pc:docMk/>
+            <pc:sldMk cId="721354222" sldId="284"/>
+            <ac:picMk id="6" creationId="{41439958-C093-2001-BDED-EB73245A4FA4}"/>
+          </ac:picMkLst>
+        </pc:picChg>
+      </pc:sldChg>
+      <pc:sldChg chg="del">
+        <pc:chgData name="JENNY CAROLINA DUSSÁN NIÑO" userId="eaf10c2cd7d88393" providerId="LiveId" clId="{480980D8-EB31-4630-8616-892D1CF22178}" dt="2024-02-01T03:30:26.308" v="1297" actId="2696"/>
+        <pc:sldMkLst>
+          <pc:docMk/>
+          <pc:sldMk cId="472859940" sldId="285"/>
+        </pc:sldMkLst>
+      </pc:sldChg>
+      <pc:sldChg chg="modSp mod">
+        <pc:chgData name="JENNY CAROLINA DUSSÁN NIÑO" userId="eaf10c2cd7d88393" providerId="LiveId" clId="{480980D8-EB31-4630-8616-892D1CF22178}" dt="2024-02-01T03:22:16.443" v="1266" actId="1076"/>
+        <pc:sldMkLst>
+          <pc:docMk/>
+          <pc:sldMk cId="3582707283" sldId="286"/>
+        </pc:sldMkLst>
+        <pc:picChg chg="mod">
+          <ac:chgData name="JENNY CAROLINA DUSSÁN NIÑO" userId="eaf10c2cd7d88393" providerId="LiveId" clId="{480980D8-EB31-4630-8616-892D1CF22178}" dt="2024-02-01T03:22:16.443" v="1266" actId="1076"/>
+          <ac:picMkLst>
+            <pc:docMk/>
+            <pc:sldMk cId="3582707283" sldId="286"/>
+            <ac:picMk id="4" creationId="{2153C611-9F2B-E074-8802-2B8C9D847A9A}"/>
+          </ac:picMkLst>
+        </pc:picChg>
+      </pc:sldChg>
+      <pc:sldChg chg="addSp modSp mod">
+        <pc:chgData name="JENNY CAROLINA DUSSÁN NIÑO" userId="eaf10c2cd7d88393" providerId="LiveId" clId="{480980D8-EB31-4630-8616-892D1CF22178}" dt="2024-02-01T03:24:30.059" v="1281" actId="14100"/>
+        <pc:sldMkLst>
+          <pc:docMk/>
+          <pc:sldMk cId="3392682303" sldId="287"/>
+        </pc:sldMkLst>
+        <pc:spChg chg="add">
+          <ac:chgData name="JENNY CAROLINA DUSSÁN NIÑO" userId="eaf10c2cd7d88393" providerId="LiveId" clId="{480980D8-EB31-4630-8616-892D1CF22178}" dt="2024-02-01T03:23:58.611" v="1268"/>
+          <ac:spMkLst>
+            <pc:docMk/>
+            <pc:sldMk cId="3392682303" sldId="287"/>
+            <ac:spMk id="2" creationId="{1E37F5F5-BD96-3B7A-62EC-14D1875F6244}"/>
+          </ac:spMkLst>
+        </pc:spChg>
+        <pc:spChg chg="add mod">
+          <ac:chgData name="JENNY CAROLINA DUSSÁN NIÑO" userId="eaf10c2cd7d88393" providerId="LiveId" clId="{480980D8-EB31-4630-8616-892D1CF22178}" dt="2024-02-01T03:24:05.269" v="1273"/>
+          <ac:spMkLst>
+            <pc:docMk/>
+            <pc:sldMk cId="3392682303" sldId="287"/>
+            <ac:spMk id="3" creationId="{DBE06D6D-A1BB-3A00-C4F9-A46BFE367475}"/>
+          </ac:spMkLst>
+        </pc:spChg>
+        <pc:picChg chg="mod">
+          <ac:chgData name="JENNY CAROLINA DUSSÁN NIÑO" userId="eaf10c2cd7d88393" providerId="LiveId" clId="{480980D8-EB31-4630-8616-892D1CF22178}" dt="2024-02-01T03:24:30.059" v="1281" actId="14100"/>
+          <ac:picMkLst>
+            <pc:docMk/>
+            <pc:sldMk cId="3392682303" sldId="287"/>
+            <ac:picMk id="4" creationId="{80AC31A1-1C0D-9872-DA0C-71E3A725B6C3}"/>
+          </ac:picMkLst>
+        </pc:picChg>
+        <pc:picChg chg="add mod">
+          <ac:chgData name="JENNY CAROLINA DUSSÁN NIÑO" userId="eaf10c2cd7d88393" providerId="LiveId" clId="{480980D8-EB31-4630-8616-892D1CF22178}" dt="2024-02-01T03:24:27.282" v="1280" actId="14100"/>
+          <ac:picMkLst>
+            <pc:docMk/>
+            <pc:sldMk cId="3392682303" sldId="287"/>
+            <ac:picMk id="5" creationId="{C75EC34E-D286-2AA2-A9A9-77704FBBB2A4}"/>
+          </ac:picMkLst>
+        </pc:picChg>
       </pc:sldChg>
       <pc:sldChg chg="addSp delSp modSp mod">
         <pc:chgData name="JENNY CAROLINA DUSSÁN NIÑO" userId="eaf10c2cd7d88393" providerId="LiveId" clId="{480980D8-EB31-4630-8616-892D1CF22178}" dt="2024-01-23T00:04:13.972" v="33" actId="1076"/>
@@ -333,6 +567,76 @@
           </ac:picMkLst>
         </pc:picChg>
       </pc:sldChg>
+      <pc:sldChg chg="addSp delSp modSp new mod">
+        <pc:chgData name="JENNY CAROLINA DUSSÁN NIÑO" userId="eaf10c2cd7d88393" providerId="LiveId" clId="{480980D8-EB31-4630-8616-892D1CF22178}" dt="2024-02-01T03:47:12.812" v="1312" actId="14100"/>
+        <pc:sldMkLst>
+          <pc:docMk/>
+          <pc:sldMk cId="1699068938" sldId="293"/>
+        </pc:sldMkLst>
+        <pc:spChg chg="del">
+          <ac:chgData name="JENNY CAROLINA DUSSÁN NIÑO" userId="eaf10c2cd7d88393" providerId="LiveId" clId="{480980D8-EB31-4630-8616-892D1CF22178}" dt="2024-02-01T03:46:56.258" v="1307" actId="478"/>
+          <ac:spMkLst>
+            <pc:docMk/>
+            <pc:sldMk cId="1699068938" sldId="293"/>
+            <ac:spMk id="2" creationId="{A5133F5C-19F2-D512-F5A0-8EDE4F1FE1B6}"/>
+          </ac:spMkLst>
+        </pc:spChg>
+        <pc:spChg chg="del">
+          <ac:chgData name="JENNY CAROLINA DUSSÁN NIÑO" userId="eaf10c2cd7d88393" providerId="LiveId" clId="{480980D8-EB31-4630-8616-892D1CF22178}" dt="2024-02-01T03:46:57.877" v="1308" actId="478"/>
+          <ac:spMkLst>
+            <pc:docMk/>
+            <pc:sldMk cId="1699068938" sldId="293"/>
+            <ac:spMk id="3" creationId="{0DA42443-3D11-81DA-D7AA-6F016B7AB7A0}"/>
+          </ac:spMkLst>
+        </pc:spChg>
+        <pc:spChg chg="add">
+          <ac:chgData name="JENNY CAROLINA DUSSÁN NIÑO" userId="eaf10c2cd7d88393" providerId="LiveId" clId="{480980D8-EB31-4630-8616-892D1CF22178}" dt="2024-02-01T03:46:59.308" v="1309"/>
+          <ac:spMkLst>
+            <pc:docMk/>
+            <pc:sldMk cId="1699068938" sldId="293"/>
+            <ac:spMk id="4" creationId="{A7E4420F-478C-DDE0-5A43-32B1DB5D39D6}"/>
+          </ac:spMkLst>
+        </pc:spChg>
+        <pc:picChg chg="add mod">
+          <ac:chgData name="JENNY CAROLINA DUSSÁN NIÑO" userId="eaf10c2cd7d88393" providerId="LiveId" clId="{480980D8-EB31-4630-8616-892D1CF22178}" dt="2024-02-01T03:47:12.812" v="1312" actId="14100"/>
+          <ac:picMkLst>
+            <pc:docMk/>
+            <pc:sldMk cId="1699068938" sldId="293"/>
+            <ac:picMk id="5" creationId="{D05146DD-A41F-543D-59FB-4C7F3C3C0393}"/>
+          </ac:picMkLst>
+        </pc:picChg>
+      </pc:sldChg>
+      <pc:sldChg chg="addSp delSp new mod">
+        <pc:chgData name="JENNY CAROLINA DUSSÁN NIÑO" userId="eaf10c2cd7d88393" providerId="LiveId" clId="{480980D8-EB31-4630-8616-892D1CF22178}" dt="2024-02-01T03:49:33.650" v="1316"/>
+        <pc:sldMkLst>
+          <pc:docMk/>
+          <pc:sldMk cId="1777478949" sldId="294"/>
+        </pc:sldMkLst>
+        <pc:spChg chg="del">
+          <ac:chgData name="JENNY CAROLINA DUSSÁN NIÑO" userId="eaf10c2cd7d88393" providerId="LiveId" clId="{480980D8-EB31-4630-8616-892D1CF22178}" dt="2024-02-01T03:47:30.401" v="1314" actId="478"/>
+          <ac:spMkLst>
+            <pc:docMk/>
+            <pc:sldMk cId="1777478949" sldId="294"/>
+            <ac:spMk id="2" creationId="{DF5CEA3D-99A7-D575-4A51-95861924C031}"/>
+          </ac:spMkLst>
+        </pc:spChg>
+        <pc:spChg chg="del">
+          <ac:chgData name="JENNY CAROLINA DUSSÁN NIÑO" userId="eaf10c2cd7d88393" providerId="LiveId" clId="{480980D8-EB31-4630-8616-892D1CF22178}" dt="2024-02-01T03:47:32.044" v="1315" actId="478"/>
+          <ac:spMkLst>
+            <pc:docMk/>
+            <pc:sldMk cId="1777478949" sldId="294"/>
+            <ac:spMk id="3" creationId="{021F6823-824E-404B-B33E-7920DF626101}"/>
+          </ac:spMkLst>
+        </pc:spChg>
+        <pc:picChg chg="add">
+          <ac:chgData name="JENNY CAROLINA DUSSÁN NIÑO" userId="eaf10c2cd7d88393" providerId="LiveId" clId="{480980D8-EB31-4630-8616-892D1CF22178}" dt="2024-02-01T03:49:33.650" v="1316"/>
+          <ac:picMkLst>
+            <pc:docMk/>
+            <pc:sldMk cId="1777478949" sldId="294"/>
+            <ac:picMk id="4" creationId="{8ADAE7EF-7486-682B-0C85-03500CB6E904}"/>
+          </ac:picMkLst>
+        </pc:picChg>
+      </pc:sldChg>
     </pc:docChg>
   </pc:docChgLst>
 </pc:chgInfo>
@@ -420,7 +724,7 @@
           <a:p>
             <a:fld id="{F0331309-95D5-4F23-A343-7F784524681D}" type="datetimeFigureOut">
               <a:rPr lang="es-CO" smtClean="0"/>
-              <a:t>22/01/2024</a:t>
+              <a:t>24/01/2024</a:t>
             </a:fld>
             <a:endParaRPr lang="es-CO"/>
           </a:p>
@@ -742,8 +1046,31 @@
             </a:r>
             <a:r>
               <a:rPr lang="es-CO" dirty="0"/>
-              <a:t> aunque la muestra poblacional es pequeña, puede existir un sesgo en los extremos de las edades </a:t>
-            </a:r>
+              <a:t> aunque la muestra poblacional es pequeña, puede existir un sesgo en los extremos de las</a:t>
+            </a:r>
+          </a:p>
+          <a:p>
+            <a:r>
+              <a:rPr lang="es-CO" dirty="0"/>
+              <a:t>edades .</a:t>
+            </a:r>
+          </a:p>
+          <a:p>
+            <a:r>
+              <a:rPr lang="es-CO" dirty="0"/>
+              <a:t>Criterio: Tamaño de muestra suficiente como criterio de inclusión en los modelos. </a:t>
+            </a:r>
+          </a:p>
+          <a:p>
+            <a:r>
+              <a:rPr lang="es-CO" dirty="0"/>
+              <a:t>Se excluye porque es una muestra para los dos </a:t>
+            </a:r>
+            <a:r>
+              <a:rPr lang="es-CO" dirty="0" err="1"/>
+              <a:t>generos</a:t>
+            </a:r>
+            <a:endParaRPr lang="es-CO" dirty="0"/>
           </a:p>
         </p:txBody>
       </p:sp>
@@ -932,7 +1259,13 @@
             </a:r>
             <a:r>
               <a:rPr lang="es-CO" dirty="0"/>
-              <a:t> rico la seroprevalencia mayo esta entre los 20-30 y va disminuyendo con el tiempo</a:t>
+              <a:t> rico la seroprevalencia mayo esta entre los 20-30 y va disminuyendo con el tiempo.</a:t>
+            </a:r>
+          </a:p>
+          <a:p>
+            <a:r>
+              <a:rPr lang="es-CO" dirty="0"/>
+              <a:t>No uso porque esta mirando 2 ato riesgo al tiempo</a:t>
             </a:r>
           </a:p>
         </p:txBody>
@@ -1019,16 +1352,21 @@
           <a:p>
             <a:r>
               <a:rPr lang="es-CO" dirty="0"/>
-              <a:t>Tendencia a </a:t>
+              <a:t>Primer grupo de edad con poca tamaño de muestra </a:t>
             </a:r>
             <a:r>
               <a:rPr lang="es-CO" dirty="0" err="1"/>
-              <a:t>picosde</a:t>
+              <a:t>pendiet</a:t>
             </a:r>
             <a:r>
               <a:rPr lang="es-CO" dirty="0"/>
-              <a:t> seroprevalencia después de los 30 años</a:t>
-            </a:r>
+              <a:t> </a:t>
+            </a:r>
+            <a:r>
+              <a:rPr lang="es-CO" dirty="0" err="1"/>
+              <a:t>reevaluacion</a:t>
+            </a:r>
+            <a:endParaRPr lang="es-CO" dirty="0"/>
           </a:p>
         </p:txBody>
       </p:sp>
@@ -1287,13 +1625,14 @@
           <a:lstStyle/>
           <a:p>
             <a:r>
+              <a:rPr lang="es-CO" dirty="0"/>
+              <a:t>Es una tendencia que no coincide con los </a:t>
+            </a:r>
+            <a:r>
               <a:rPr lang="es-CO" dirty="0" err="1"/>
-              <a:t>Extrarer</a:t>
-            </a:r>
-            <a:r>
-              <a:rPr lang="es-CO" dirty="0"/>
-              <a:t> los puntos NA de edad </a:t>
-            </a:r>
+              <a:t>demas</a:t>
+            </a:r>
+            <a:endParaRPr lang="es-CO" dirty="0"/>
           </a:p>
         </p:txBody>
       </p:sp>
@@ -1482,7 +1821,7 @@
           <a:p>
             <a:fld id="{70D2BE9D-4DFE-402A-853A-6E7B91741EE3}" type="datetimeFigureOut">
               <a:rPr lang="es-CO" smtClean="0"/>
-              <a:t>22/01/2024</a:t>
+              <a:t>24/01/2024</a:t>
             </a:fld>
             <a:endParaRPr lang="es-CO"/>
           </a:p>
@@ -1682,7 +2021,7 @@
           <a:p>
             <a:fld id="{70D2BE9D-4DFE-402A-853A-6E7B91741EE3}" type="datetimeFigureOut">
               <a:rPr lang="es-CO" smtClean="0"/>
-              <a:t>22/01/2024</a:t>
+              <a:t>24/01/2024</a:t>
             </a:fld>
             <a:endParaRPr lang="es-CO"/>
           </a:p>
@@ -1892,7 +2231,7 @@
           <a:p>
             <a:fld id="{70D2BE9D-4DFE-402A-853A-6E7B91741EE3}" type="datetimeFigureOut">
               <a:rPr lang="es-CO" smtClean="0"/>
-              <a:t>22/01/2024</a:t>
+              <a:t>24/01/2024</a:t>
             </a:fld>
             <a:endParaRPr lang="es-CO"/>
           </a:p>
@@ -2092,7 +2431,7 @@
           <a:p>
             <a:fld id="{70D2BE9D-4DFE-402A-853A-6E7B91741EE3}" type="datetimeFigureOut">
               <a:rPr lang="es-CO" smtClean="0"/>
-              <a:t>22/01/2024</a:t>
+              <a:t>24/01/2024</a:t>
             </a:fld>
             <a:endParaRPr lang="es-CO"/>
           </a:p>
@@ -2368,7 +2707,7 @@
           <a:p>
             <a:fld id="{70D2BE9D-4DFE-402A-853A-6E7B91741EE3}" type="datetimeFigureOut">
               <a:rPr lang="es-CO" smtClean="0"/>
-              <a:t>22/01/2024</a:t>
+              <a:t>24/01/2024</a:t>
             </a:fld>
             <a:endParaRPr lang="es-CO"/>
           </a:p>
@@ -2636,7 +2975,7 @@
           <a:p>
             <a:fld id="{70D2BE9D-4DFE-402A-853A-6E7B91741EE3}" type="datetimeFigureOut">
               <a:rPr lang="es-CO" smtClean="0"/>
-              <a:t>22/01/2024</a:t>
+              <a:t>24/01/2024</a:t>
             </a:fld>
             <a:endParaRPr lang="es-CO"/>
           </a:p>
@@ -3051,7 +3390,7 @@
           <a:p>
             <a:fld id="{70D2BE9D-4DFE-402A-853A-6E7B91741EE3}" type="datetimeFigureOut">
               <a:rPr lang="es-CO" smtClean="0"/>
-              <a:t>22/01/2024</a:t>
+              <a:t>24/01/2024</a:t>
             </a:fld>
             <a:endParaRPr lang="es-CO"/>
           </a:p>
@@ -3193,7 +3532,7 @@
           <a:p>
             <a:fld id="{70D2BE9D-4DFE-402A-853A-6E7B91741EE3}" type="datetimeFigureOut">
               <a:rPr lang="es-CO" smtClean="0"/>
-              <a:t>22/01/2024</a:t>
+              <a:t>24/01/2024</a:t>
             </a:fld>
             <a:endParaRPr lang="es-CO"/>
           </a:p>
@@ -3306,7 +3645,7 @@
           <a:p>
             <a:fld id="{70D2BE9D-4DFE-402A-853A-6E7B91741EE3}" type="datetimeFigureOut">
               <a:rPr lang="es-CO" smtClean="0"/>
-              <a:t>22/01/2024</a:t>
+              <a:t>24/01/2024</a:t>
             </a:fld>
             <a:endParaRPr lang="es-CO"/>
           </a:p>
@@ -3619,7 +3958,7 @@
           <a:p>
             <a:fld id="{70D2BE9D-4DFE-402A-853A-6E7B91741EE3}" type="datetimeFigureOut">
               <a:rPr lang="es-CO" smtClean="0"/>
-              <a:t>22/01/2024</a:t>
+              <a:t>24/01/2024</a:t>
             </a:fld>
             <a:endParaRPr lang="es-CO"/>
           </a:p>
@@ -3908,7 +4247,7 @@
           <a:p>
             <a:fld id="{70D2BE9D-4DFE-402A-853A-6E7B91741EE3}" type="datetimeFigureOut">
               <a:rPr lang="es-CO" smtClean="0"/>
-              <a:t>22/01/2024</a:t>
+              <a:t>24/01/2024</a:t>
             </a:fld>
             <a:endParaRPr lang="es-CO"/>
           </a:p>
@@ -4151,7 +4490,7 @@
           <a:p>
             <a:fld id="{70D2BE9D-4DFE-402A-853A-6E7B91741EE3}" type="datetimeFigureOut">
               <a:rPr lang="es-CO" smtClean="0"/>
-              <a:t>22/01/2024</a:t>
+              <a:t>24/01/2024</a:t>
             </a:fld>
             <a:endParaRPr lang="es-CO"/>
           </a:p>
@@ -4654,8 +4993,38 @@
         </p:blipFill>
         <p:spPr>
           <a:xfrm>
-            <a:off x="2378511" y="0"/>
-            <a:ext cx="7434978" cy="6858000"/>
+            <a:off x="235078" y="68826"/>
+            <a:ext cx="5329980" cy="6858000"/>
+          </a:xfrm>
+          <a:prstGeom prst="rect">
+            <a:avLst/>
+          </a:prstGeom>
+        </p:spPr>
+      </p:pic>
+      <p:pic>
+        <p:nvPicPr>
+          <p:cNvPr id="3" name="Imagen 2">
+            <a:extLst>
+              <a:ext uri="{FF2B5EF4-FFF2-40B4-BE49-F238E27FC236}">
+                <a16:creationId xmlns:a16="http://schemas.microsoft.com/office/drawing/2014/main" id="{CD37695B-DE35-B1B1-B507-5553FAF5252D}"/>
+              </a:ext>
+            </a:extLst>
+          </p:cNvPr>
+          <p:cNvPicPr>
+            <a:picLocks noChangeAspect="1"/>
+          </p:cNvPicPr>
+          <p:nvPr/>
+        </p:nvPicPr>
+        <p:blipFill>
+          <a:blip r:embed="rId3"/>
+          <a:stretch>
+            <a:fillRect/>
+          </a:stretch>
+        </p:blipFill>
+        <p:spPr>
+          <a:xfrm>
+            <a:off x="6096000" y="0"/>
+            <a:ext cx="5329980" cy="6858000"/>
           </a:xfrm>
           <a:prstGeom prst="rect">
             <a:avLst/>
@@ -4714,8 +5083,38 @@
         </p:blipFill>
         <p:spPr>
           <a:xfrm>
-            <a:off x="2378511" y="0"/>
-            <a:ext cx="7434978" cy="6858000"/>
+            <a:off x="195750" y="0"/>
+            <a:ext cx="6706496" cy="6858000"/>
+          </a:xfrm>
+          <a:prstGeom prst="rect">
+            <a:avLst/>
+          </a:prstGeom>
+        </p:spPr>
+      </p:pic>
+      <p:pic>
+        <p:nvPicPr>
+          <p:cNvPr id="3" name="Imagen 2">
+            <a:extLst>
+              <a:ext uri="{FF2B5EF4-FFF2-40B4-BE49-F238E27FC236}">
+                <a16:creationId xmlns:a16="http://schemas.microsoft.com/office/drawing/2014/main" id="{ECDDC326-97BB-37DE-7C44-0530D4172C51}"/>
+              </a:ext>
+            </a:extLst>
+          </p:cNvPr>
+          <p:cNvPicPr>
+            <a:picLocks noChangeAspect="1"/>
+          </p:cNvPicPr>
+          <p:nvPr/>
+        </p:nvPicPr>
+        <p:blipFill>
+          <a:blip r:embed="rId3"/>
+          <a:stretch>
+            <a:fillRect/>
+          </a:stretch>
+        </p:blipFill>
+        <p:spPr>
+          <a:xfrm>
+            <a:off x="6400799" y="0"/>
+            <a:ext cx="5697973" cy="6858000"/>
           </a:xfrm>
           <a:prstGeom prst="rect">
             <a:avLst/>
@@ -4774,8 +5173,38 @@
         </p:blipFill>
         <p:spPr>
           <a:xfrm>
-            <a:off x="2378511" y="0"/>
-            <a:ext cx="7434978" cy="6858000"/>
+            <a:off x="0" y="127819"/>
+            <a:ext cx="6538452" cy="6858000"/>
+          </a:xfrm>
+          <a:prstGeom prst="rect">
+            <a:avLst/>
+          </a:prstGeom>
+        </p:spPr>
+      </p:pic>
+      <p:pic>
+        <p:nvPicPr>
+          <p:cNvPr id="2" name="Imagen 1">
+            <a:extLst>
+              <a:ext uri="{FF2B5EF4-FFF2-40B4-BE49-F238E27FC236}">
+                <a16:creationId xmlns:a16="http://schemas.microsoft.com/office/drawing/2014/main" id="{FC433412-23A6-9F34-1086-B54E43DEA265}"/>
+              </a:ext>
+            </a:extLst>
+          </p:cNvPr>
+          <p:cNvPicPr>
+            <a:picLocks noChangeAspect="1"/>
+          </p:cNvPicPr>
+          <p:nvPr/>
+        </p:nvPicPr>
+        <p:blipFill>
+          <a:blip r:embed="rId4"/>
+          <a:stretch>
+            <a:fillRect/>
+          </a:stretch>
+        </p:blipFill>
+        <p:spPr>
+          <a:xfrm>
+            <a:off x="7089058" y="127819"/>
+            <a:ext cx="4822902" cy="6858000"/>
           </a:xfrm>
           <a:prstGeom prst="rect">
             <a:avLst/>
@@ -4817,7 +5246,7 @@
           <p:cNvPr id="4" name="Imagen 3">
             <a:extLst>
               <a:ext uri="{FF2B5EF4-FFF2-40B4-BE49-F238E27FC236}">
-                <a16:creationId xmlns:a16="http://schemas.microsoft.com/office/drawing/2014/main" id="{42D9CB7E-BCA2-BBD4-15CF-67E02D2E7542}"/>
+                <a16:creationId xmlns:a16="http://schemas.microsoft.com/office/drawing/2014/main" id="{2153C611-9F2B-E074-8802-2B8C9D847A9A}"/>
               </a:ext>
             </a:extLst>
           </p:cNvPr>
@@ -4834,8 +5263,8 @@
         </p:blipFill>
         <p:spPr>
           <a:xfrm>
-            <a:off x="2378511" y="0"/>
-            <a:ext cx="7434978" cy="6858000"/>
+            <a:off x="2084439" y="-127820"/>
+            <a:ext cx="7482348" cy="6858000"/>
           </a:xfrm>
           <a:prstGeom prst="rect">
             <a:avLst/>
@@ -4845,7 +5274,7 @@
     </p:spTree>
     <p:extLst>
       <p:ext uri="{BB962C8B-B14F-4D97-AF65-F5344CB8AC3E}">
-        <p14:creationId xmlns:p14="http://schemas.microsoft.com/office/powerpoint/2010/main" val="472859940"/>
+        <p14:creationId xmlns:p14="http://schemas.microsoft.com/office/powerpoint/2010/main" val="3582707283"/>
       </p:ext>
     </p:extLst>
   </p:cSld>
@@ -4877,7 +5306,7 @@
           <p:cNvPr id="4" name="Imagen 3">
             <a:extLst>
               <a:ext uri="{FF2B5EF4-FFF2-40B4-BE49-F238E27FC236}">
-                <a16:creationId xmlns:a16="http://schemas.microsoft.com/office/drawing/2014/main" id="{2153C611-9F2B-E074-8802-2B8C9D847A9A}"/>
+                <a16:creationId xmlns:a16="http://schemas.microsoft.com/office/drawing/2014/main" id="{80AC31A1-1C0D-9872-DA0C-71E3A725B6C3}"/>
               </a:ext>
             </a:extLst>
           </p:cNvPr>
@@ -4894,8 +5323,83 @@
         </p:blipFill>
         <p:spPr>
           <a:xfrm>
-            <a:off x="2378511" y="0"/>
-            <a:ext cx="7434978" cy="6858000"/>
+            <a:off x="0" y="0"/>
+            <a:ext cx="6410632" cy="6858000"/>
+          </a:xfrm>
+          <a:prstGeom prst="rect">
+            <a:avLst/>
+          </a:prstGeom>
+        </p:spPr>
+      </p:pic>
+      <p:sp>
+        <p:nvSpPr>
+          <p:cNvPr id="2" name="AutoShape 2">
+            <a:extLst>
+              <a:ext uri="{FF2B5EF4-FFF2-40B4-BE49-F238E27FC236}">
+                <a16:creationId xmlns:a16="http://schemas.microsoft.com/office/drawing/2014/main" id="{1E37F5F5-BD96-3B7A-62EC-14D1875F6244}"/>
+              </a:ext>
+            </a:extLst>
+          </p:cNvPr>
+          <p:cNvSpPr>
+            <a:spLocks noChangeAspect="1" noChangeArrowheads="1"/>
+          </p:cNvSpPr>
+          <p:nvPr/>
+        </p:nvSpPr>
+        <p:spPr bwMode="auto">
+          <a:xfrm>
+            <a:off x="5943600" y="3276600"/>
+            <a:ext cx="304800" cy="304800"/>
+          </a:xfrm>
+          <a:prstGeom prst="rect">
+            <a:avLst/>
+          </a:prstGeom>
+          <a:noFill/>
+          <a:extLst>
+            <a:ext uri="{909E8E84-426E-40DD-AFC4-6F175D3DCCD1}">
+              <a14:hiddenFill xmlns:a14="http://schemas.microsoft.com/office/drawing/2010/main">
+                <a:solidFill>
+                  <a:srgbClr val="FFFFFF"/>
+                </a:solidFill>
+              </a14:hiddenFill>
+            </a:ext>
+          </a:extLst>
+        </p:spPr>
+        <p:txBody>
+          <a:bodyPr vert="horz" wrap="square" lIns="91440" tIns="45720" rIns="91440" bIns="45720" numCol="1" anchor="t" anchorCtr="0" compatLnSpc="1">
+            <a:prstTxWarp prst="textNoShape">
+              <a:avLst/>
+            </a:prstTxWarp>
+          </a:bodyPr>
+          <a:lstStyle/>
+          <a:p>
+            <a:endParaRPr lang="es-CO"/>
+          </a:p>
+        </p:txBody>
+      </p:sp>
+      <p:pic>
+        <p:nvPicPr>
+          <p:cNvPr id="5" name="Imagen 4">
+            <a:extLst>
+              <a:ext uri="{FF2B5EF4-FFF2-40B4-BE49-F238E27FC236}">
+                <a16:creationId xmlns:a16="http://schemas.microsoft.com/office/drawing/2014/main" id="{C75EC34E-D286-2AA2-A9A9-77704FBBB2A4}"/>
+              </a:ext>
+            </a:extLst>
+          </p:cNvPr>
+          <p:cNvPicPr>
+            <a:picLocks noChangeAspect="1"/>
+          </p:cNvPicPr>
+          <p:nvPr/>
+        </p:nvPicPr>
+        <p:blipFill>
+          <a:blip r:embed="rId3"/>
+          <a:stretch>
+            <a:fillRect/>
+          </a:stretch>
+        </p:blipFill>
+        <p:spPr>
+          <a:xfrm>
+            <a:off x="6626942" y="0"/>
+            <a:ext cx="5565058" cy="6858000"/>
           </a:xfrm>
           <a:prstGeom prst="rect">
             <a:avLst/>
@@ -4905,7 +5409,7 @@
     </p:spTree>
     <p:extLst>
       <p:ext uri="{BB962C8B-B14F-4D97-AF65-F5344CB8AC3E}">
-        <p14:creationId xmlns:p14="http://schemas.microsoft.com/office/powerpoint/2010/main" val="3582707283"/>
+        <p14:creationId xmlns:p14="http://schemas.microsoft.com/office/powerpoint/2010/main" val="3392682303"/>
       </p:ext>
     </p:extLst>
   </p:cSld>
@@ -4934,10 +5438,10 @@
       </p:grpSpPr>
       <p:pic>
         <p:nvPicPr>
-          <p:cNvPr id="4" name="Imagen 3">
-            <a:extLst>
-              <a:ext uri="{FF2B5EF4-FFF2-40B4-BE49-F238E27FC236}">
-                <a16:creationId xmlns:a16="http://schemas.microsoft.com/office/drawing/2014/main" id="{80AC31A1-1C0D-9872-DA0C-71E3A725B6C3}"/>
+          <p:cNvPr id="5" name="Imagen 4">
+            <a:extLst>
+              <a:ext uri="{FF2B5EF4-FFF2-40B4-BE49-F238E27FC236}">
+                <a16:creationId xmlns:a16="http://schemas.microsoft.com/office/drawing/2014/main" id="{D05146DD-A41F-543D-59FB-4C7F3C3C0393}"/>
               </a:ext>
             </a:extLst>
           </p:cNvPr>
@@ -4954,8 +5458,8 @@
         </p:blipFill>
         <p:spPr>
           <a:xfrm>
-            <a:off x="2378511" y="0"/>
-            <a:ext cx="7434978" cy="6858000"/>
+            <a:off x="747252" y="0"/>
+            <a:ext cx="9969909" cy="6858000"/>
           </a:xfrm>
           <a:prstGeom prst="rect">
             <a:avLst/>
@@ -4965,7 +5469,7 @@
     </p:spTree>
     <p:extLst>
       <p:ext uri="{BB962C8B-B14F-4D97-AF65-F5344CB8AC3E}">
-        <p14:creationId xmlns:p14="http://schemas.microsoft.com/office/powerpoint/2010/main" val="3392682303"/>
+        <p14:creationId xmlns:p14="http://schemas.microsoft.com/office/powerpoint/2010/main" val="1699068938"/>
       </p:ext>
     </p:extLst>
   </p:cSld>
@@ -4992,6 +5496,66 @@
           <a:chExt cx="0" cy="0"/>
         </a:xfrm>
       </p:grpSpPr>
+      <p:pic>
+        <p:nvPicPr>
+          <p:cNvPr id="4" name="Imagen 3">
+            <a:extLst>
+              <a:ext uri="{FF2B5EF4-FFF2-40B4-BE49-F238E27FC236}">
+                <a16:creationId xmlns:a16="http://schemas.microsoft.com/office/drawing/2014/main" id="{8ADAE7EF-7486-682B-0C85-03500CB6E904}"/>
+              </a:ext>
+            </a:extLst>
+          </p:cNvPr>
+          <p:cNvPicPr>
+            <a:picLocks noChangeAspect="1"/>
+          </p:cNvPicPr>
+          <p:nvPr/>
+        </p:nvPicPr>
+        <p:blipFill>
+          <a:blip r:embed="rId2"/>
+          <a:stretch>
+            <a:fillRect/>
+          </a:stretch>
+        </p:blipFill>
+        <p:spPr>
+          <a:xfrm>
+            <a:off x="2177664" y="0"/>
+            <a:ext cx="7836671" cy="6858000"/>
+          </a:xfrm>
+          <a:prstGeom prst="rect">
+            <a:avLst/>
+          </a:prstGeom>
+        </p:spPr>
+      </p:pic>
+    </p:spTree>
+    <p:extLst>
+      <p:ext uri="{BB962C8B-B14F-4D97-AF65-F5344CB8AC3E}">
+        <p14:creationId xmlns:p14="http://schemas.microsoft.com/office/powerpoint/2010/main" val="1777478949"/>
+      </p:ext>
+    </p:extLst>
+  </p:cSld>
+  <p:clrMapOvr>
+    <a:masterClrMapping/>
+  </p:clrMapOvr>
+</p:sld>
+</file>
+
+<file path=ppt/slides/slide17.xml><?xml version="1.0" encoding="utf-8"?>
+<p:sld xmlns:a="http://schemas.openxmlformats.org/drawingml/2006/main" xmlns:r="http://schemas.openxmlformats.org/officeDocument/2006/relationships" xmlns:p="http://schemas.openxmlformats.org/presentationml/2006/main">
+  <p:cSld>
+    <p:spTree>
+      <p:nvGrpSpPr>
+        <p:cNvPr id="1" name=""/>
+        <p:cNvGrpSpPr/>
+        <p:nvPr/>
+      </p:nvGrpSpPr>
+      <p:grpSpPr>
+        <a:xfrm>
+          <a:off x="0" y="0"/>
+          <a:ext cx="0" cy="0"/>
+          <a:chOff x="0" y="0"/>
+          <a:chExt cx="0" cy="0"/>
+        </a:xfrm>
+      </p:grpSpPr>
       <p:sp>
         <p:nvSpPr>
           <p:cNvPr id="2" name="Título 1">
@@ -5033,7 +5597,7 @@
 </p:sld>
 </file>
 
-<file path=ppt/slides/slide17.xml><?xml version="1.0" encoding="utf-8"?>
+<file path=ppt/slides/slide18.xml><?xml version="1.0" encoding="utf-8"?>
 <p:sld xmlns:a="http://schemas.openxmlformats.org/drawingml/2006/main" xmlns:r="http://schemas.openxmlformats.org/officeDocument/2006/relationships" xmlns:p="http://schemas.openxmlformats.org/presentationml/2006/main">
   <p:cSld>
     <p:bg>
@@ -5857,7 +6421,7 @@
 </p:sld>
 </file>
 
-<file path=ppt/slides/slide18.xml><?xml version="1.0" encoding="utf-8"?>
+<file path=ppt/slides/slide19.xml><?xml version="1.0" encoding="utf-8"?>
 <p:sld xmlns:a="http://schemas.openxmlformats.org/drawingml/2006/main" xmlns:r="http://schemas.openxmlformats.org/officeDocument/2006/relationships" xmlns:p="http://schemas.openxmlformats.org/presentationml/2006/main">
   <p:cSld>
     <p:spTree>
@@ -5943,101 +6507,6 @@
     <p:extLst>
       <p:ext uri="{BB962C8B-B14F-4D97-AF65-F5344CB8AC3E}">
         <p14:creationId xmlns:p14="http://schemas.microsoft.com/office/powerpoint/2010/main" val="805240594"/>
-      </p:ext>
-    </p:extLst>
-  </p:cSld>
-  <p:clrMapOvr>
-    <a:masterClrMapping/>
-  </p:clrMapOvr>
-</p:sld>
-</file>
-
-<file path=ppt/slides/slide19.xml><?xml version="1.0" encoding="utf-8"?>
-<p:sld xmlns:a="http://schemas.openxmlformats.org/drawingml/2006/main" xmlns:r="http://schemas.openxmlformats.org/officeDocument/2006/relationships" xmlns:p="http://schemas.openxmlformats.org/presentationml/2006/main">
-  <p:cSld>
-    <p:spTree>
-      <p:nvGrpSpPr>
-        <p:cNvPr id="1" name=""/>
-        <p:cNvGrpSpPr/>
-        <p:nvPr/>
-      </p:nvGrpSpPr>
-      <p:grpSpPr>
-        <a:xfrm>
-          <a:off x="0" y="0"/>
-          <a:ext cx="0" cy="0"/>
-          <a:chOff x="0" y="0"/>
-          <a:chExt cx="0" cy="0"/>
-        </a:xfrm>
-      </p:grpSpPr>
-      <p:sp>
-        <p:nvSpPr>
-          <p:cNvPr id="2" name="Título 1">
-            <a:extLst>
-              <a:ext uri="{FF2B5EF4-FFF2-40B4-BE49-F238E27FC236}">
-                <a16:creationId xmlns:a16="http://schemas.microsoft.com/office/drawing/2014/main" id="{725CE834-F55E-5261-44A8-53727AD96487}"/>
-              </a:ext>
-            </a:extLst>
-          </p:cNvPr>
-          <p:cNvSpPr>
-            <a:spLocks noGrp="1"/>
-          </p:cNvSpPr>
-          <p:nvPr>
-            <p:ph type="title"/>
-          </p:nvPr>
-        </p:nvSpPr>
-        <p:spPr>
-          <a:xfrm>
-            <a:off x="838200" y="365126"/>
-            <a:ext cx="10515600" cy="315912"/>
-          </a:xfrm>
-        </p:spPr>
-        <p:txBody>
-          <a:bodyPr>
-            <a:normAutofit fontScale="90000"/>
-          </a:bodyPr>
-          <a:lstStyle/>
-          <a:p>
-            <a:r>
-              <a:rPr lang="es-CO" dirty="0"/>
-              <a:t>SEROFOI -VPH – COL (HPV16)</a:t>
-            </a:r>
-          </a:p>
-        </p:txBody>
-      </p:sp>
-      <p:pic>
-        <p:nvPicPr>
-          <p:cNvPr id="8" name="Imagen 7">
-            <a:extLst>
-              <a:ext uri="{FF2B5EF4-FFF2-40B4-BE49-F238E27FC236}">
-                <a16:creationId xmlns:a16="http://schemas.microsoft.com/office/drawing/2014/main" id="{E46B91E9-45A3-E6AE-9873-33FFE574D708}"/>
-              </a:ext>
-            </a:extLst>
-          </p:cNvPr>
-          <p:cNvPicPr>
-            <a:picLocks noChangeAspect="1"/>
-          </p:cNvPicPr>
-          <p:nvPr/>
-        </p:nvPicPr>
-        <p:blipFill>
-          <a:blip r:embed="rId2"/>
-          <a:stretch>
-            <a:fillRect/>
-          </a:stretch>
-        </p:blipFill>
-        <p:spPr>
-          <a:xfrm>
-            <a:off x="838200" y="681038"/>
-            <a:ext cx="7836671" cy="6858000"/>
-          </a:xfrm>
-          <a:prstGeom prst="rect">
-            <a:avLst/>
-          </a:prstGeom>
-        </p:spPr>
-      </p:pic>
-    </p:spTree>
-    <p:extLst>
-      <p:ext uri="{BB962C8B-B14F-4D97-AF65-F5344CB8AC3E}">
-        <p14:creationId xmlns:p14="http://schemas.microsoft.com/office/powerpoint/2010/main" val="1227578467"/>
       </p:ext>
     </p:extLst>
   </p:cSld>
@@ -6108,6 +6577,101 @@
 </file>
 
 <file path=ppt/slides/slide20.xml><?xml version="1.0" encoding="utf-8"?>
+<p:sld xmlns:a="http://schemas.openxmlformats.org/drawingml/2006/main" xmlns:r="http://schemas.openxmlformats.org/officeDocument/2006/relationships" xmlns:p="http://schemas.openxmlformats.org/presentationml/2006/main">
+  <p:cSld>
+    <p:spTree>
+      <p:nvGrpSpPr>
+        <p:cNvPr id="1" name=""/>
+        <p:cNvGrpSpPr/>
+        <p:nvPr/>
+      </p:nvGrpSpPr>
+      <p:grpSpPr>
+        <a:xfrm>
+          <a:off x="0" y="0"/>
+          <a:ext cx="0" cy="0"/>
+          <a:chOff x="0" y="0"/>
+          <a:chExt cx="0" cy="0"/>
+        </a:xfrm>
+      </p:grpSpPr>
+      <p:sp>
+        <p:nvSpPr>
+          <p:cNvPr id="2" name="Título 1">
+            <a:extLst>
+              <a:ext uri="{FF2B5EF4-FFF2-40B4-BE49-F238E27FC236}">
+                <a16:creationId xmlns:a16="http://schemas.microsoft.com/office/drawing/2014/main" id="{725CE834-F55E-5261-44A8-53727AD96487}"/>
+              </a:ext>
+            </a:extLst>
+          </p:cNvPr>
+          <p:cNvSpPr>
+            <a:spLocks noGrp="1"/>
+          </p:cNvSpPr>
+          <p:nvPr>
+            <p:ph type="title"/>
+          </p:nvPr>
+        </p:nvSpPr>
+        <p:spPr>
+          <a:xfrm>
+            <a:off x="838200" y="365126"/>
+            <a:ext cx="10515600" cy="315912"/>
+          </a:xfrm>
+        </p:spPr>
+        <p:txBody>
+          <a:bodyPr>
+            <a:normAutofit fontScale="90000"/>
+          </a:bodyPr>
+          <a:lstStyle/>
+          <a:p>
+            <a:r>
+              <a:rPr lang="es-CO" dirty="0"/>
+              <a:t>SEROFOI -VPH – COL (HPV16)</a:t>
+            </a:r>
+          </a:p>
+        </p:txBody>
+      </p:sp>
+      <p:pic>
+        <p:nvPicPr>
+          <p:cNvPr id="8" name="Imagen 7">
+            <a:extLst>
+              <a:ext uri="{FF2B5EF4-FFF2-40B4-BE49-F238E27FC236}">
+                <a16:creationId xmlns:a16="http://schemas.microsoft.com/office/drawing/2014/main" id="{E46B91E9-45A3-E6AE-9873-33FFE574D708}"/>
+              </a:ext>
+            </a:extLst>
+          </p:cNvPr>
+          <p:cNvPicPr>
+            <a:picLocks noChangeAspect="1"/>
+          </p:cNvPicPr>
+          <p:nvPr/>
+        </p:nvPicPr>
+        <p:blipFill>
+          <a:blip r:embed="rId2"/>
+          <a:stretch>
+            <a:fillRect/>
+          </a:stretch>
+        </p:blipFill>
+        <p:spPr>
+          <a:xfrm>
+            <a:off x="838200" y="681038"/>
+            <a:ext cx="7836671" cy="6858000"/>
+          </a:xfrm>
+          <a:prstGeom prst="rect">
+            <a:avLst/>
+          </a:prstGeom>
+        </p:spPr>
+      </p:pic>
+    </p:spTree>
+    <p:extLst>
+      <p:ext uri="{BB962C8B-B14F-4D97-AF65-F5344CB8AC3E}">
+        <p14:creationId xmlns:p14="http://schemas.microsoft.com/office/powerpoint/2010/main" val="1227578467"/>
+      </p:ext>
+    </p:extLst>
+  </p:cSld>
+  <p:clrMapOvr>
+    <a:masterClrMapping/>
+  </p:clrMapOvr>
+</p:sld>
+</file>
+
+<file path=ppt/slides/slide21.xml><?xml version="1.0" encoding="utf-8"?>
 <p:sld xmlns:a="http://schemas.openxmlformats.org/drawingml/2006/main" xmlns:r="http://schemas.openxmlformats.org/officeDocument/2006/relationships" xmlns:p="http://schemas.openxmlformats.org/presentationml/2006/main">
   <p:cSld>
     <p:spTree>
@@ -6361,8 +6925,38 @@
         </p:blipFill>
         <p:spPr>
           <a:xfrm>
-            <a:off x="2378511" y="0"/>
+            <a:off x="0" y="0"/>
             <a:ext cx="7434978" cy="6858000"/>
+          </a:xfrm>
+          <a:prstGeom prst="rect">
+            <a:avLst/>
+          </a:prstGeom>
+        </p:spPr>
+      </p:pic>
+      <p:pic>
+        <p:nvPicPr>
+          <p:cNvPr id="2" name="Imagen 1">
+            <a:extLst>
+              <a:ext uri="{FF2B5EF4-FFF2-40B4-BE49-F238E27FC236}">
+                <a16:creationId xmlns:a16="http://schemas.microsoft.com/office/drawing/2014/main" id="{69C565E8-506A-ED8D-49EE-518703EB6847}"/>
+              </a:ext>
+            </a:extLst>
+          </p:cNvPr>
+          <p:cNvPicPr>
+            <a:picLocks noChangeAspect="1"/>
+          </p:cNvPicPr>
+          <p:nvPr/>
+        </p:nvPicPr>
+        <p:blipFill>
+          <a:blip r:embed="rId4"/>
+          <a:stretch>
+            <a:fillRect/>
+          </a:stretch>
+        </p:blipFill>
+        <p:spPr>
+          <a:xfrm>
+            <a:off x="6260122" y="2512"/>
+            <a:ext cx="6455491" cy="6858000"/>
           </a:xfrm>
           <a:prstGeom prst="rect">
             <a:avLst/>
@@ -6421,8 +7015,38 @@
         </p:blipFill>
         <p:spPr>
           <a:xfrm>
-            <a:off x="2378511" y="0"/>
+            <a:off x="-207373" y="0"/>
             <a:ext cx="7434978" cy="6858000"/>
+          </a:xfrm>
+          <a:prstGeom prst="rect">
+            <a:avLst/>
+          </a:prstGeom>
+        </p:spPr>
+      </p:pic>
+      <p:pic>
+        <p:nvPicPr>
+          <p:cNvPr id="2" name="Imagen 1">
+            <a:extLst>
+              <a:ext uri="{FF2B5EF4-FFF2-40B4-BE49-F238E27FC236}">
+                <a16:creationId xmlns:a16="http://schemas.microsoft.com/office/drawing/2014/main" id="{B5FB21C5-9006-5CBC-506B-5A8642767092}"/>
+              </a:ext>
+            </a:extLst>
+          </p:cNvPr>
+          <p:cNvPicPr>
+            <a:picLocks noChangeAspect="1"/>
+          </p:cNvPicPr>
+          <p:nvPr/>
+        </p:nvPicPr>
+        <p:blipFill>
+          <a:blip r:embed="rId4"/>
+          <a:stretch>
+            <a:fillRect/>
+          </a:stretch>
+        </p:blipFill>
+        <p:spPr>
+          <a:xfrm>
+            <a:off x="6096000" y="157532"/>
+            <a:ext cx="7105716" cy="6858000"/>
           </a:xfrm>
           <a:prstGeom prst="rect">
             <a:avLst/>
@@ -6481,8 +7105,38 @@
         </p:blipFill>
         <p:spPr>
           <a:xfrm>
-            <a:off x="2378511" y="0"/>
-            <a:ext cx="7434978" cy="6858000"/>
+            <a:off x="1" y="0"/>
+            <a:ext cx="5801032" cy="6858000"/>
+          </a:xfrm>
+          <a:prstGeom prst="rect">
+            <a:avLst/>
+          </a:prstGeom>
+        </p:spPr>
+      </p:pic>
+      <p:pic>
+        <p:nvPicPr>
+          <p:cNvPr id="2" name="Imagen 1">
+            <a:extLst>
+              <a:ext uri="{FF2B5EF4-FFF2-40B4-BE49-F238E27FC236}">
+                <a16:creationId xmlns:a16="http://schemas.microsoft.com/office/drawing/2014/main" id="{C1E5E247-B1DE-468F-FB67-4A2FEB63170B}"/>
+              </a:ext>
+            </a:extLst>
+          </p:cNvPr>
+          <p:cNvPicPr>
+            <a:picLocks noChangeAspect="1"/>
+          </p:cNvPicPr>
+          <p:nvPr/>
+        </p:nvPicPr>
+        <p:blipFill>
+          <a:blip r:embed="rId3"/>
+          <a:stretch>
+            <a:fillRect/>
+          </a:stretch>
+        </p:blipFill>
+        <p:spPr>
+          <a:xfrm>
+            <a:off x="5978013" y="0"/>
+            <a:ext cx="5928852" cy="6858000"/>
           </a:xfrm>
           <a:prstGeom prst="rect">
             <a:avLst/>
@@ -6541,8 +7195,38 @@
         </p:blipFill>
         <p:spPr>
           <a:xfrm>
-            <a:off x="2378511" y="0"/>
-            <a:ext cx="7434978" cy="6858000"/>
+            <a:off x="77763" y="0"/>
+            <a:ext cx="6264043" cy="6858000"/>
+          </a:xfrm>
+          <a:prstGeom prst="rect">
+            <a:avLst/>
+          </a:prstGeom>
+        </p:spPr>
+      </p:pic>
+      <p:pic>
+        <p:nvPicPr>
+          <p:cNvPr id="2" name="Imagen 1">
+            <a:extLst>
+              <a:ext uri="{FF2B5EF4-FFF2-40B4-BE49-F238E27FC236}">
+                <a16:creationId xmlns:a16="http://schemas.microsoft.com/office/drawing/2014/main" id="{475915E5-9E15-BFBA-9E93-F9D7D42AEC00}"/>
+              </a:ext>
+            </a:extLst>
+          </p:cNvPr>
+          <p:cNvPicPr>
+            <a:picLocks noChangeAspect="1"/>
+          </p:cNvPicPr>
+          <p:nvPr/>
+        </p:nvPicPr>
+        <p:blipFill>
+          <a:blip r:embed="rId4"/>
+          <a:stretch>
+            <a:fillRect/>
+          </a:stretch>
+        </p:blipFill>
+        <p:spPr>
+          <a:xfrm>
+            <a:off x="6862915" y="0"/>
+            <a:ext cx="5132439" cy="6858000"/>
           </a:xfrm>
           <a:prstGeom prst="rect">
             <a:avLst/>
@@ -6601,8 +7285,38 @@
         </p:blipFill>
         <p:spPr>
           <a:xfrm>
-            <a:off x="2378511" y="0"/>
-            <a:ext cx="7434978" cy="6858000"/>
+            <a:off x="254743" y="0"/>
+            <a:ext cx="5969076" cy="6858000"/>
+          </a:xfrm>
+          <a:prstGeom prst="rect">
+            <a:avLst/>
+          </a:prstGeom>
+        </p:spPr>
+      </p:pic>
+      <p:pic>
+        <p:nvPicPr>
+          <p:cNvPr id="2" name="Imagen 1">
+            <a:extLst>
+              <a:ext uri="{FF2B5EF4-FFF2-40B4-BE49-F238E27FC236}">
+                <a16:creationId xmlns:a16="http://schemas.microsoft.com/office/drawing/2014/main" id="{69B4214C-2C4B-235D-5B06-34212EE46555}"/>
+              </a:ext>
+            </a:extLst>
+          </p:cNvPr>
+          <p:cNvPicPr>
+            <a:picLocks noChangeAspect="1"/>
+          </p:cNvPicPr>
+          <p:nvPr/>
+        </p:nvPicPr>
+        <p:blipFill>
+          <a:blip r:embed="rId3"/>
+          <a:stretch>
+            <a:fillRect/>
+          </a:stretch>
+        </p:blipFill>
+        <p:spPr>
+          <a:xfrm>
+            <a:off x="6302477" y="0"/>
+            <a:ext cx="5540658" cy="6858000"/>
           </a:xfrm>
           <a:prstGeom prst="rect">
             <a:avLst/>

</xml_diff>